<commit_message>
agrego diapo en ppt, y test lua
</commit_message>
<xml_diff>
--- a/LUA.pptx
+++ b/LUA.pptx
@@ -5,7 +5,7 @@
     <p:sldMasterId id="2147483648" r:id="rId1"/>
   </p:sldMasterIdLst>
   <p:notesMasterIdLst>
-    <p:notesMasterId r:id="rId15"/>
+    <p:notesMasterId r:id="rId17"/>
   </p:notesMasterIdLst>
   <p:sldIdLst>
     <p:sldId id="256" r:id="rId2"/>
@@ -16,11 +16,13 @@
     <p:sldId id="268" r:id="rId7"/>
     <p:sldId id="267" r:id="rId8"/>
     <p:sldId id="263" r:id="rId9"/>
-    <p:sldId id="261" r:id="rId10"/>
-    <p:sldId id="258" r:id="rId11"/>
-    <p:sldId id="260" r:id="rId12"/>
-    <p:sldId id="259" r:id="rId13"/>
-    <p:sldId id="262" r:id="rId14"/>
+    <p:sldId id="269" r:id="rId10"/>
+    <p:sldId id="270" r:id="rId11"/>
+    <p:sldId id="261" r:id="rId12"/>
+    <p:sldId id="258" r:id="rId13"/>
+    <p:sldId id="260" r:id="rId14"/>
+    <p:sldId id="259" r:id="rId15"/>
+    <p:sldId id="262" r:id="rId16"/>
   </p:sldIdLst>
   <p:sldSz cx="9144000" cy="6858000" type="screen4x3"/>
   <p:notesSz cx="6858000" cy="9144000"/>
@@ -119,7 +121,27 @@
       </a:defRPr>
     </a:lvl9pPr>
   </p:defaultTextStyle>
+  <p:extLst>
+    <p:ext uri="{EFAFB233-063F-42B5-8137-9DF3F51BA10A}">
+      <p15:sldGuideLst xmlns:p15="http://schemas.microsoft.com/office/powerpoint/2012/main">
+        <p15:guide id="1" orient="horz" pos="2160">
+          <p15:clr>
+            <a:srgbClr val="A4A3A4"/>
+          </p15:clr>
+        </p15:guide>
+        <p15:guide id="2" pos="2880">
+          <p15:clr>
+            <a:srgbClr val="A4A3A4"/>
+          </p15:clr>
+        </p15:guide>
+      </p15:sldGuideLst>
+    </p:ext>
+  </p:extLst>
 </p:presentation>
+</file>
+
+<file path=ppt/revisionInfo.xml><?xml version="1.0" encoding="utf-8"?>
+<p1510:revInfo xmlns:a="http://schemas.openxmlformats.org/drawingml/2006/main" xmlns:r="http://schemas.openxmlformats.org/officeDocument/2006/relationships" xmlns:p1510="http://schemas.microsoft.com/office/powerpoint/2015/10/main"/>
 </file>
 
 <file path=ppt/notesMasters/notesMaster1.xml><?xml version="1.0" encoding="utf-8"?>
@@ -204,7 +226,7 @@
           <a:p>
             <a:fld id="{A48AE367-37BA-4B14-955E-4B30AA7A67B5}" type="datetimeFigureOut">
               <a:rPr lang="es-AR" smtClean="0"/>
-              <a:t>25/5/2018</a:t>
+              <a:t>30/5/2018</a:t>
             </a:fld>
             <a:endParaRPr lang="es-AR"/>
           </a:p>
@@ -270,35 +292,35 @@
           <a:p>
             <a:pPr lvl="0"/>
             <a:r>
-              <a:rPr lang="es-ES" smtClean="0"/>
+              <a:rPr lang="es-ES"/>
               <a:t>Haga clic para modificar el estilo de texto del patrón</a:t>
             </a:r>
           </a:p>
           <a:p>
             <a:pPr lvl="1"/>
             <a:r>
-              <a:rPr lang="es-ES" smtClean="0"/>
+              <a:rPr lang="es-ES"/>
               <a:t>Segundo nivel</a:t>
             </a:r>
           </a:p>
           <a:p>
             <a:pPr lvl="2"/>
             <a:r>
-              <a:rPr lang="es-ES" smtClean="0"/>
+              <a:rPr lang="es-ES"/>
               <a:t>Tercer nivel</a:t>
             </a:r>
           </a:p>
           <a:p>
             <a:pPr lvl="3"/>
             <a:r>
-              <a:rPr lang="es-ES" smtClean="0"/>
+              <a:rPr lang="es-ES"/>
               <a:t>Cuarto nivel</a:t>
             </a:r>
           </a:p>
           <a:p>
             <a:pPr lvl="4"/>
             <a:r>
-              <a:rPr lang="es-ES" smtClean="0"/>
+              <a:rPr lang="es-ES"/>
               <a:t>Quinto nivel</a:t>
             </a:r>
             <a:endParaRPr lang="es-AR"/>
@@ -516,11 +538,11 @@
           <a:lstStyle/>
           <a:p>
             <a:r>
-              <a:rPr lang="es-AR" dirty="0" smtClean="0"/>
+              <a:rPr lang="es-AR" dirty="0"/>
               <a:t>Explicar El origen de</a:t>
             </a:r>
             <a:r>
-              <a:rPr lang="es-AR" baseline="0" dirty="0" smtClean="0"/>
+              <a:rPr lang="es-AR" baseline="0" dirty="0"/>
               <a:t> cómo nace LUA</a:t>
             </a:r>
             <a:endParaRPr lang="es-AR" dirty="0"/>
@@ -600,259 +622,258 @@
         <p:spPr/>
         <p:txBody>
           <a:bodyPr>
-            <a:normAutofit/>
+            <a:normAutofit lnSpcReduction="10000"/>
           </a:bodyPr>
           <a:lstStyle/>
           <a:p>
             <a:r>
-              <a:rPr lang="es-AR" dirty="0" smtClean="0"/>
+              <a:rPr lang="es-AR" dirty="0"/>
               <a:t>http://www.lua.org/news.html#1993</a:t>
             </a:r>
           </a:p>
           <a:p>
-            <a:endParaRPr lang="es-AR" dirty="0" smtClean="0"/>
-          </a:p>
-          <a:p>
-            <a:r>
-              <a:rPr lang="es-AR" dirty="0" smtClean="0"/>
+            <a:endParaRPr lang="es-AR" dirty="0"/>
+          </a:p>
+          <a:p>
+            <a:r>
+              <a:rPr lang="es-AR" dirty="0"/>
               <a:t>LUA 2.1: Los retrocesos son una función programada que </a:t>
             </a:r>
             <a:r>
-              <a:rPr lang="es-AR" dirty="0" err="1" smtClean="0"/>
+              <a:rPr lang="es-AR" dirty="0" err="1"/>
               <a:t>Lua</a:t>
             </a:r>
             <a:r>
-              <a:rPr lang="es-AR" dirty="0" smtClean="0"/>
+              <a:rPr lang="es-AR" dirty="0"/>
               <a:t> la llama cuando no sabe que hacer</a:t>
             </a:r>
           </a:p>
           <a:p>
-            <a:endParaRPr lang="es-AR" dirty="0" smtClean="0"/>
-          </a:p>
-          <a:p>
-            <a:r>
-              <a:rPr lang="es-AR" dirty="0" smtClean="0"/>
+            <a:endParaRPr lang="es-AR" dirty="0"/>
+          </a:p>
+          <a:p>
+            <a:r>
+              <a:rPr lang="es-AR" dirty="0"/>
               <a:t>LUA</a:t>
             </a:r>
             <a:r>
-              <a:rPr lang="es-AR" baseline="0" dirty="0" smtClean="0"/>
+              <a:rPr lang="es-AR" baseline="0" dirty="0"/>
               <a:t> 3.0: En reemplazo de los retrocesos, llamado durante la ejecución del programa para cambiar el comportamiento de </a:t>
             </a:r>
             <a:r>
-              <a:rPr lang="es-AR" baseline="0" dirty="0" err="1" smtClean="0"/>
+              <a:rPr lang="es-AR" baseline="0" dirty="0" err="1"/>
               <a:t>Lua</a:t>
             </a:r>
             <a:r>
-              <a:rPr lang="es-AR" baseline="0" dirty="0" smtClean="0"/>
+              <a:rPr lang="es-AR" baseline="0" dirty="0"/>
               <a:t>.</a:t>
             </a:r>
           </a:p>
           <a:p>
-            <a:endParaRPr lang="es-AR" baseline="0" dirty="0" smtClean="0"/>
-          </a:p>
-          <a:p>
-            <a:r>
-              <a:rPr lang="es-AR" baseline="0" dirty="0" smtClean="0"/>
+            <a:endParaRPr lang="es-AR" baseline="0" dirty="0"/>
+          </a:p>
+          <a:p>
+            <a:r>
+              <a:rPr lang="es-AR" baseline="0" dirty="0"/>
               <a:t>LUA 4.0: Declaraciones múltiples parecido a Pascal o C, con asignación y control de estructuras y llamadas </a:t>
             </a:r>
             <a:r>
-              <a:rPr lang="es-AR" baseline="0" dirty="0" err="1" smtClean="0"/>
+              <a:rPr lang="es-AR" baseline="0" dirty="0" err="1"/>
               <a:t>procedurales</a:t>
             </a:r>
             <a:r>
-              <a:rPr lang="es-AR" baseline="0" dirty="0" smtClean="0"/>
+              <a:rPr lang="es-AR" baseline="0" dirty="0"/>
               <a:t>.</a:t>
             </a:r>
           </a:p>
           <a:p>
-            <a:endParaRPr lang="es-AR" baseline="0" dirty="0" smtClean="0"/>
-          </a:p>
-          <a:p>
-            <a:r>
-              <a:rPr lang="es-AR" baseline="0" dirty="0" smtClean="0"/>
+            <a:endParaRPr lang="es-AR" baseline="0" dirty="0"/>
+          </a:p>
+          <a:p>
+            <a:r>
+              <a:rPr lang="es-AR" baseline="0" dirty="0"/>
               <a:t>LUA 5.0: </a:t>
             </a:r>
-            <a:r>
-              <a:rPr lang="es-AR" baseline="0" dirty="0" err="1" smtClean="0"/>
+          </a:p>
+          <a:p>
+            <a:endParaRPr lang="es-AR" baseline="0" dirty="0"/>
+          </a:p>
+          <a:p>
+            <a:r>
+              <a:rPr lang="es-AR" baseline="0" dirty="0" err="1"/>
               <a:t>Scoping</a:t>
             </a:r>
             <a:r>
-              <a:rPr lang="es-AR" baseline="0" dirty="0" smtClean="0"/>
+              <a:rPr lang="es-AR" baseline="0" dirty="0"/>
               <a:t> en vez de </a:t>
             </a:r>
             <a:r>
-              <a:rPr lang="es-AR" baseline="0" dirty="0" err="1" smtClean="0"/>
+              <a:rPr lang="es-AR" baseline="0" dirty="0" err="1"/>
               <a:t>upvalues</a:t>
             </a:r>
             <a:r>
-              <a:rPr lang="es-AR" baseline="0" dirty="0" smtClean="0"/>
+              <a:rPr lang="es-AR" baseline="0" dirty="0"/>
               <a:t> (…)</a:t>
             </a:r>
           </a:p>
           <a:p>
-            <a:endParaRPr lang="es-AR" baseline="0" dirty="0" smtClean="0"/>
-          </a:p>
-          <a:p>
-            <a:endParaRPr lang="es-AR" baseline="0" dirty="0" smtClean="0"/>
-          </a:p>
-          <a:p>
-            <a:endParaRPr lang="es-AR" baseline="0" dirty="0" smtClean="0"/>
-          </a:p>
-          <a:p>
-            <a:r>
-              <a:rPr lang="en-US" dirty="0" smtClean="0"/>
+            <a:endParaRPr lang="es-AR" baseline="0" dirty="0"/>
+          </a:p>
+          <a:p>
+            <a:r>
+              <a:rPr lang="en-US" dirty="0"/>
               <a:t>collaborative multithreading via </a:t>
             </a:r>
             <a:r>
-              <a:rPr lang="en-US" dirty="0" err="1" smtClean="0"/>
+              <a:rPr lang="en-US" dirty="0" err="1"/>
               <a:t>Lua</a:t>
             </a:r>
             <a:r>
-              <a:rPr lang="en-US" dirty="0" smtClean="0"/>
+              <a:rPr lang="en-US" dirty="0"/>
               <a:t> </a:t>
             </a:r>
             <a:r>
-              <a:rPr lang="en-US" dirty="0" err="1" smtClean="0"/>
+              <a:rPr lang="en-US" dirty="0" err="1"/>
               <a:t>coroutines</a:t>
             </a:r>
             <a:r>
-              <a:rPr lang="en-US" dirty="0" smtClean="0"/>
+              <a:rPr lang="en-US" dirty="0"/>
               <a:t>, full lexical scoping instead of </a:t>
             </a:r>
             <a:r>
-              <a:rPr lang="en-US" dirty="0" err="1" smtClean="0"/>
+              <a:rPr lang="en-US" dirty="0" err="1"/>
               <a:t>upvalues</a:t>
             </a:r>
             <a:r>
-              <a:rPr lang="en-US" dirty="0" smtClean="0"/>
+              <a:rPr lang="en-US" dirty="0"/>
               <a:t>, and </a:t>
             </a:r>
             <a:r>
-              <a:rPr lang="en-US" dirty="0" err="1" smtClean="0"/>
+              <a:rPr lang="en-US" dirty="0" err="1"/>
               <a:t>metatables</a:t>
             </a:r>
             <a:r>
-              <a:rPr lang="en-US" dirty="0" smtClean="0"/>
+              <a:rPr lang="en-US" dirty="0"/>
               <a:t> instead of tags and tag methods</a:t>
             </a:r>
           </a:p>
           <a:p>
-            <a:endParaRPr lang="en-US" baseline="0" dirty="0" smtClean="0"/>
-          </a:p>
-          <a:p>
-            <a:r>
-              <a:rPr lang="en-US" dirty="0" smtClean="0"/>
+            <a:endParaRPr lang="en-US" baseline="0" dirty="0"/>
+          </a:p>
+          <a:p>
+            <a:r>
+              <a:rPr lang="en-US" dirty="0"/>
               <a:t>introduces </a:t>
             </a:r>
             <a:r>
-              <a:rPr lang="en-US" dirty="0" err="1" smtClean="0"/>
+              <a:rPr lang="en-US" dirty="0" err="1"/>
               <a:t>booleans</a:t>
             </a:r>
             <a:r>
-              <a:rPr lang="en-US" dirty="0" smtClean="0"/>
+              <a:rPr lang="en-US" dirty="0"/>
               <a:t>, proper tail calls, and weak tables</a:t>
             </a:r>
           </a:p>
           <a:p>
-            <a:endParaRPr lang="en-US" baseline="0" dirty="0" smtClean="0"/>
-          </a:p>
-          <a:p>
-            <a:r>
-              <a:rPr lang="es-AR" dirty="0" err="1" smtClean="0"/>
+            <a:endParaRPr lang="en-US" baseline="0" dirty="0"/>
+          </a:p>
+          <a:p>
+            <a:r>
+              <a:rPr lang="es-AR" dirty="0" err="1"/>
               <a:t>better</a:t>
             </a:r>
             <a:r>
-              <a:rPr lang="es-AR" dirty="0" smtClean="0"/>
+              <a:rPr lang="es-AR" dirty="0"/>
               <a:t> </a:t>
             </a:r>
             <a:r>
-              <a:rPr lang="es-AR" dirty="0" err="1" smtClean="0"/>
+              <a:rPr lang="es-AR" dirty="0" err="1"/>
               <a:t>support</a:t>
             </a:r>
             <a:r>
-              <a:rPr lang="es-AR" dirty="0" smtClean="0"/>
+              <a:rPr lang="es-AR" dirty="0"/>
               <a:t> </a:t>
             </a:r>
             <a:r>
-              <a:rPr lang="es-AR" dirty="0" err="1" smtClean="0"/>
+              <a:rPr lang="es-AR" dirty="0" err="1"/>
               <a:t>for</a:t>
             </a:r>
             <a:r>
-              <a:rPr lang="es-AR" dirty="0" smtClean="0"/>
+              <a:rPr lang="es-AR" dirty="0"/>
               <a:t> </a:t>
             </a:r>
             <a:r>
-              <a:rPr lang="es-AR" dirty="0" err="1" smtClean="0"/>
+              <a:rPr lang="es-AR" dirty="0" err="1"/>
               <a:t>packages</a:t>
             </a:r>
             <a:r>
-              <a:rPr lang="es-AR" dirty="0" smtClean="0"/>
+              <a:rPr lang="es-AR" dirty="0"/>
               <a:t>, new API </a:t>
             </a:r>
             <a:r>
-              <a:rPr lang="es-AR" dirty="0" err="1" smtClean="0"/>
+              <a:rPr lang="es-AR" dirty="0" err="1"/>
               <a:t>for</a:t>
             </a:r>
             <a:r>
-              <a:rPr lang="es-AR" dirty="0" smtClean="0"/>
+              <a:rPr lang="es-AR" dirty="0"/>
               <a:t> </a:t>
             </a:r>
             <a:r>
-              <a:rPr lang="es-AR" dirty="0" err="1" smtClean="0"/>
+              <a:rPr lang="es-AR" dirty="0" err="1"/>
               <a:t>loading</a:t>
             </a:r>
             <a:r>
-              <a:rPr lang="es-AR" dirty="0" smtClean="0"/>
+              <a:rPr lang="es-AR" dirty="0"/>
               <a:t> </a:t>
             </a:r>
             <a:r>
-              <a:rPr lang="es-AR" dirty="0" err="1" smtClean="0"/>
+              <a:rPr lang="es-AR" dirty="0" err="1"/>
               <a:t>Lua</a:t>
             </a:r>
             <a:r>
-              <a:rPr lang="es-AR" dirty="0" smtClean="0"/>
+              <a:rPr lang="es-AR" dirty="0"/>
               <a:t> </a:t>
             </a:r>
             <a:r>
-              <a:rPr lang="es-AR" dirty="0" err="1" smtClean="0"/>
+              <a:rPr lang="es-AR" dirty="0" err="1"/>
               <a:t>chunks</a:t>
             </a:r>
             <a:r>
-              <a:rPr lang="es-AR" dirty="0" smtClean="0"/>
+              <a:rPr lang="es-AR" dirty="0"/>
               <a:t>, new error </a:t>
             </a:r>
             <a:r>
-              <a:rPr lang="es-AR" dirty="0" err="1" smtClean="0"/>
+              <a:rPr lang="es-AR" dirty="0" err="1"/>
               <a:t>handling</a:t>
             </a:r>
             <a:r>
-              <a:rPr lang="es-AR" dirty="0" smtClean="0"/>
+              <a:rPr lang="es-AR" dirty="0"/>
               <a:t> </a:t>
             </a:r>
             <a:r>
-              <a:rPr lang="es-AR" dirty="0" err="1" smtClean="0"/>
+              <a:rPr lang="es-AR" dirty="0" err="1"/>
               <a:t>protocol</a:t>
             </a:r>
             <a:r>
-              <a:rPr lang="es-AR" dirty="0" smtClean="0"/>
+              <a:rPr lang="es-AR" dirty="0"/>
               <a:t>, </a:t>
             </a:r>
             <a:r>
-              <a:rPr lang="es-AR" dirty="0" err="1" smtClean="0"/>
+              <a:rPr lang="es-AR" dirty="0" err="1"/>
               <a:t>better</a:t>
             </a:r>
             <a:r>
-              <a:rPr lang="es-AR" dirty="0" smtClean="0"/>
+              <a:rPr lang="es-AR" dirty="0"/>
               <a:t> error </a:t>
             </a:r>
             <a:r>
-              <a:rPr lang="es-AR" dirty="0" err="1" smtClean="0"/>
+              <a:rPr lang="es-AR" dirty="0" err="1"/>
               <a:t>messages</a:t>
             </a:r>
-            <a:endParaRPr lang="es-AR" baseline="0" dirty="0" smtClean="0"/>
-          </a:p>
-          <a:p>
-            <a:endParaRPr lang="es-AR" baseline="0" dirty="0" smtClean="0"/>
+            <a:endParaRPr lang="es-AR" baseline="0" dirty="0"/>
+          </a:p>
+          <a:p>
+            <a:endParaRPr lang="es-AR" baseline="0" dirty="0"/>
           </a:p>
           <a:p>
             <a:endParaRPr lang="es-AR" dirty="0"/>
@@ -937,35 +958,35 @@
           <a:lstStyle/>
           <a:p>
             <a:r>
-              <a:rPr lang="es-AR" dirty="0" smtClean="0"/>
+              <a:rPr lang="es-AR" dirty="0"/>
               <a:t>LUA 5.3: Introducción de </a:t>
             </a:r>
             <a:r>
-              <a:rPr lang="es-AR" dirty="0" err="1" smtClean="0"/>
+              <a:rPr lang="es-AR" dirty="0" err="1"/>
               <a:t>Integers</a:t>
             </a:r>
             <a:r>
-              <a:rPr lang="es-AR" dirty="0" smtClean="0"/>
+              <a:rPr lang="es-AR" dirty="0"/>
               <a:t>,</a:t>
             </a:r>
             <a:r>
-              <a:rPr lang="es-AR" baseline="0" dirty="0" smtClean="0"/>
+              <a:rPr lang="es-AR" baseline="0" dirty="0"/>
               <a:t> hasta antes de este momento se utilizaba Punto Flotante de Doble Precisión. Por lo que ahora están los </a:t>
             </a:r>
             <a:r>
-              <a:rPr lang="es-AR" baseline="0" dirty="0" err="1" smtClean="0"/>
+              <a:rPr lang="es-AR" baseline="0" dirty="0" err="1"/>
               <a:t>floats</a:t>
             </a:r>
             <a:r>
-              <a:rPr lang="es-AR" baseline="0" dirty="0" smtClean="0"/>
+              <a:rPr lang="es-AR" baseline="0" dirty="0"/>
               <a:t> (de doble precisión) y los </a:t>
             </a:r>
             <a:r>
-              <a:rPr lang="es-AR" baseline="0" dirty="0" err="1" smtClean="0"/>
+              <a:rPr lang="es-AR" baseline="0" dirty="0" err="1"/>
               <a:t>Integers</a:t>
             </a:r>
             <a:r>
-              <a:rPr lang="es-AR" baseline="0" dirty="0" smtClean="0"/>
+              <a:rPr lang="es-AR" baseline="0" dirty="0"/>
               <a:t>. </a:t>
             </a:r>
             <a:endParaRPr lang="es-AR" dirty="0"/>
@@ -1050,20 +1071,20 @@
           <a:lstStyle/>
           <a:p>
             <a:r>
-              <a:rPr lang="es-AR" dirty="0" smtClean="0"/>
+              <a:rPr lang="es-AR" dirty="0"/>
               <a:t>Explicar</a:t>
             </a:r>
             <a:r>
-              <a:rPr lang="es-AR" baseline="0" dirty="0" smtClean="0"/>
+              <a:rPr lang="es-AR" baseline="0" dirty="0"/>
               <a:t> que es un lenguaje interpretado</a:t>
             </a:r>
           </a:p>
           <a:p>
-            <a:endParaRPr lang="es-AR" baseline="0" dirty="0" smtClean="0"/>
-          </a:p>
-          <a:p>
-            <a:r>
-              <a:rPr lang="es-AR" baseline="0" dirty="0" smtClean="0"/>
+            <a:endParaRPr lang="es-AR" baseline="0" dirty="0"/>
+          </a:p>
+          <a:p>
+            <a:r>
+              <a:rPr lang="es-AR" baseline="0" dirty="0"/>
               <a:t>EN PARADIGMA: Podemos partir de LUA y hacerlo Orientado a Objetos, utilizarlo en un lenguaje Funcional, GOAL (ver que es) y Concurrente. También en Descripción de Datos</a:t>
             </a:r>
           </a:p>
@@ -1150,10 +1171,9 @@
           <a:lstStyle/>
           <a:p>
             <a:r>
-              <a:rPr lang="es-AR" dirty="0" smtClean="0"/>
+              <a:rPr lang="es-AR" dirty="0"/>
               <a:t>http://lua-users.org/wiki/SampleCode</a:t>
             </a:r>
-            <a:endParaRPr lang="es-AR" dirty="0"/>
           </a:p>
         </p:txBody>
       </p:sp>
@@ -1235,10 +1255,9 @@
           <a:lstStyle/>
           <a:p>
             <a:r>
-              <a:rPr lang="es-AR" dirty="0" smtClean="0"/>
+              <a:rPr lang="es-AR" dirty="0"/>
               <a:t>http://lua-users.org/wiki/SampleCode</a:t>
             </a:r>
-            <a:endParaRPr lang="es-AR" dirty="0"/>
           </a:p>
         </p:txBody>
       </p:sp>
@@ -1292,7 +1311,7 @@
       </p:grpSpPr>
       <p:sp>
         <p:nvSpPr>
-          <p:cNvPr id="2" name="1 Marcador de imagen de diapositiva"/>
+          <p:cNvPr id="2" name="Marcador de imagen de diapositiva 1"/>
           <p:cNvSpPr>
             <a:spLocks noGrp="1" noRot="1" noChangeAspect="1"/>
           </p:cNvSpPr>
@@ -1304,7 +1323,7 @@
       </p:sp>
       <p:sp>
         <p:nvSpPr>
-          <p:cNvPr id="3" name="2 Marcador de notas"/>
+          <p:cNvPr id="3" name="Marcador de notas 2"/>
           <p:cNvSpPr>
             <a:spLocks noGrp="1"/>
           </p:cNvSpPr>
@@ -1314,22 +1333,39 @@
         </p:nvSpPr>
         <p:spPr/>
         <p:txBody>
-          <a:bodyPr>
-            <a:normAutofit/>
-          </a:bodyPr>
-          <a:lstStyle/>
-          <a:p>
-            <a:r>
-              <a:rPr lang="es-AR" dirty="0" smtClean="0"/>
-              <a:t>http://lua-users.org/wiki/SampleCode</a:t>
-            </a:r>
-            <a:endParaRPr lang="es-AR" dirty="0"/>
-          </a:p>
-        </p:txBody>
-      </p:sp>
-      <p:sp>
-        <p:nvSpPr>
-          <p:cNvPr id="4" name="3 Marcador de número de diapositiva"/>
+          <a:bodyPr/>
+          <a:lstStyle/>
+          <a:p>
+            <a:r>
+              <a:rPr lang="es-ES" dirty="0"/>
+              <a:t>En </a:t>
+            </a:r>
+            <a:r>
+              <a:rPr lang="es-ES" dirty="0" err="1"/>
+              <a:t>lenght</a:t>
+            </a:r>
+            <a:r>
+              <a:rPr lang="es-ES" dirty="0"/>
+              <a:t> no funciona cuando no hay NIL. NIL HACE TODO FUNCIONE MAL</a:t>
+            </a:r>
+          </a:p>
+          <a:p>
+            <a:endParaRPr lang="es-ES" dirty="0"/>
+          </a:p>
+          <a:p>
+            <a:endParaRPr lang="es-ES" dirty="0"/>
+          </a:p>
+          <a:p>
+            <a:r>
+              <a:rPr lang="es-ES" dirty="0"/>
+              <a:t>VER NIL -&gt; &lt;- TABLAS</a:t>
+            </a:r>
+          </a:p>
+        </p:txBody>
+      </p:sp>
+      <p:sp>
+        <p:nvSpPr>
+          <p:cNvPr id="4" name="Marcador de número de diapositiva 3"/>
           <p:cNvSpPr>
             <a:spLocks noGrp="1"/>
           </p:cNvSpPr>
@@ -1344,13 +1380,18 @@
           <a:p>
             <a:fld id="{9BC2C32D-1AA2-493A-B299-1E2C9EEC71D9}" type="slidenum">
               <a:rPr lang="es-AR" smtClean="0"/>
-              <a:t>9</a:t>
+              <a:t>10</a:t>
             </a:fld>
             <a:endParaRPr lang="es-AR"/>
           </a:p>
         </p:txBody>
       </p:sp>
     </p:spTree>
+    <p:extLst>
+      <p:ext uri="{BB962C8B-B14F-4D97-AF65-F5344CB8AC3E}">
+        <p14:creationId xmlns:p14="http://schemas.microsoft.com/office/powerpoint/2010/main" val="175668285"/>
+      </p:ext>
+    </p:extLst>
   </p:cSld>
   <p:clrMapOvr>
     <a:masterClrMapping/>
@@ -1405,10 +1446,9 @@
           <a:lstStyle/>
           <a:p>
             <a:r>
-              <a:rPr lang="es-AR" dirty="0" smtClean="0"/>
-              <a:t>http://lua-users.org/wiki/LuaComparison</a:t>
-            </a:r>
-            <a:endParaRPr lang="es-AR" dirty="0"/>
+              <a:rPr lang="es-AR" dirty="0"/>
+              <a:t>http://lua-users.org/wiki/SampleCode</a:t>
+            </a:r>
           </a:p>
         </p:txBody>
       </p:sp>
@@ -1429,7 +1469,91 @@
           <a:p>
             <a:fld id="{9BC2C32D-1AA2-493A-B299-1E2C9EEC71D9}" type="slidenum">
               <a:rPr lang="es-AR" smtClean="0"/>
-              <a:t>10</a:t>
+              <a:t>11</a:t>
+            </a:fld>
+            <a:endParaRPr lang="es-AR"/>
+          </a:p>
+        </p:txBody>
+      </p:sp>
+    </p:spTree>
+  </p:cSld>
+  <p:clrMapOvr>
+    <a:masterClrMapping/>
+  </p:clrMapOvr>
+</p:notes>
+</file>
+
+<file path=ppt/notesSlides/notesSlide9.xml><?xml version="1.0" encoding="utf-8"?>
+<p:notes xmlns:a="http://schemas.openxmlformats.org/drawingml/2006/main" xmlns:r="http://schemas.openxmlformats.org/officeDocument/2006/relationships" xmlns:p="http://schemas.openxmlformats.org/presentationml/2006/main">
+  <p:cSld>
+    <p:spTree>
+      <p:nvGrpSpPr>
+        <p:cNvPr id="1" name=""/>
+        <p:cNvGrpSpPr/>
+        <p:nvPr/>
+      </p:nvGrpSpPr>
+      <p:grpSpPr>
+        <a:xfrm>
+          <a:off x="0" y="0"/>
+          <a:ext cx="0" cy="0"/>
+          <a:chOff x="0" y="0"/>
+          <a:chExt cx="0" cy="0"/>
+        </a:xfrm>
+      </p:grpSpPr>
+      <p:sp>
+        <p:nvSpPr>
+          <p:cNvPr id="2" name="1 Marcador de imagen de diapositiva"/>
+          <p:cNvSpPr>
+            <a:spLocks noGrp="1" noRot="1" noChangeAspect="1"/>
+          </p:cNvSpPr>
+          <p:nvPr>
+            <p:ph type="sldImg"/>
+          </p:nvPr>
+        </p:nvSpPr>
+        <p:spPr/>
+      </p:sp>
+      <p:sp>
+        <p:nvSpPr>
+          <p:cNvPr id="3" name="2 Marcador de notas"/>
+          <p:cNvSpPr>
+            <a:spLocks noGrp="1"/>
+          </p:cNvSpPr>
+          <p:nvPr>
+            <p:ph type="body" idx="1"/>
+          </p:nvPr>
+        </p:nvSpPr>
+        <p:spPr/>
+        <p:txBody>
+          <a:bodyPr>
+            <a:normAutofit/>
+          </a:bodyPr>
+          <a:lstStyle/>
+          <a:p>
+            <a:r>
+              <a:rPr lang="es-AR" dirty="0"/>
+              <a:t>http://lua-users.org/wiki/LuaComparison</a:t>
+            </a:r>
+          </a:p>
+        </p:txBody>
+      </p:sp>
+      <p:sp>
+        <p:nvSpPr>
+          <p:cNvPr id="4" name="3 Marcador de número de diapositiva"/>
+          <p:cNvSpPr>
+            <a:spLocks noGrp="1"/>
+          </p:cNvSpPr>
+          <p:nvPr>
+            <p:ph type="sldNum" sz="quarter" idx="10"/>
+          </p:nvPr>
+        </p:nvSpPr>
+        <p:spPr/>
+        <p:txBody>
+          <a:bodyPr/>
+          <a:lstStyle/>
+          <a:p>
+            <a:fld id="{9BC2C32D-1AA2-493A-B299-1E2C9EEC71D9}" type="slidenum">
+              <a:rPr lang="es-AR" smtClean="0"/>
+              <a:t>12</a:t>
             </a:fld>
             <a:endParaRPr lang="es-AR"/>
           </a:p>
@@ -1481,7 +1605,7 @@
           <a:lstStyle/>
           <a:p>
             <a:r>
-              <a:rPr lang="es-ES" smtClean="0"/>
+              <a:rPr lang="es-ES"/>
               <a:t>Haga clic para modificar el estilo de título del patrón</a:t>
             </a:r>
             <a:endParaRPr lang="es-AR"/>
@@ -1600,7 +1724,7 @@
           </a:lstStyle>
           <a:p>
             <a:r>
-              <a:rPr lang="es-ES" smtClean="0"/>
+              <a:rPr lang="es-ES"/>
               <a:t>Haga clic para modificar el estilo de subtítulo del patrón</a:t>
             </a:r>
             <a:endParaRPr lang="es-AR"/>
@@ -1624,7 +1748,7 @@
           <a:p>
             <a:fld id="{1D054745-723B-474A-B41C-4B47E748DED6}" type="datetimeFigureOut">
               <a:rPr lang="es-AR" smtClean="0"/>
-              <a:t>25/5/2018</a:t>
+              <a:t>30/5/2018</a:t>
             </a:fld>
             <a:endParaRPr lang="es-AR"/>
           </a:p>
@@ -1713,7 +1837,7 @@
           <a:lstStyle/>
           <a:p>
             <a:r>
-              <a:rPr lang="es-ES" smtClean="0"/>
+              <a:rPr lang="es-ES"/>
               <a:t>Haga clic para modificar el estilo de título del patrón</a:t>
             </a:r>
             <a:endParaRPr lang="es-AR"/>
@@ -1737,35 +1861,35 @@
           <a:p>
             <a:pPr lvl="0"/>
             <a:r>
-              <a:rPr lang="es-ES" smtClean="0"/>
+              <a:rPr lang="es-ES"/>
               <a:t>Haga clic para modificar el estilo de texto del patrón</a:t>
             </a:r>
           </a:p>
           <a:p>
             <a:pPr lvl="1"/>
             <a:r>
-              <a:rPr lang="es-ES" smtClean="0"/>
+              <a:rPr lang="es-ES"/>
               <a:t>Segundo nivel</a:t>
             </a:r>
           </a:p>
           <a:p>
             <a:pPr lvl="2"/>
             <a:r>
-              <a:rPr lang="es-ES" smtClean="0"/>
+              <a:rPr lang="es-ES"/>
               <a:t>Tercer nivel</a:t>
             </a:r>
           </a:p>
           <a:p>
             <a:pPr lvl="3"/>
             <a:r>
-              <a:rPr lang="es-ES" smtClean="0"/>
+              <a:rPr lang="es-ES"/>
               <a:t>Cuarto nivel</a:t>
             </a:r>
           </a:p>
           <a:p>
             <a:pPr lvl="4"/>
             <a:r>
-              <a:rPr lang="es-ES" smtClean="0"/>
+              <a:rPr lang="es-ES"/>
               <a:t>Quinto nivel</a:t>
             </a:r>
             <a:endParaRPr lang="es-AR"/>
@@ -1789,7 +1913,7 @@
           <a:p>
             <a:fld id="{1D054745-723B-474A-B41C-4B47E748DED6}" type="datetimeFigureOut">
               <a:rPr lang="es-AR" smtClean="0"/>
-              <a:t>25/5/2018</a:t>
+              <a:t>30/5/2018</a:t>
             </a:fld>
             <a:endParaRPr lang="es-AR"/>
           </a:p>
@@ -1883,7 +2007,7 @@
           <a:lstStyle/>
           <a:p>
             <a:r>
-              <a:rPr lang="es-ES" smtClean="0"/>
+              <a:rPr lang="es-ES"/>
               <a:t>Haga clic para modificar el estilo de título del patrón</a:t>
             </a:r>
             <a:endParaRPr lang="es-AR"/>
@@ -1912,35 +2036,35 @@
           <a:p>
             <a:pPr lvl="0"/>
             <a:r>
-              <a:rPr lang="es-ES" smtClean="0"/>
+              <a:rPr lang="es-ES"/>
               <a:t>Haga clic para modificar el estilo de texto del patrón</a:t>
             </a:r>
           </a:p>
           <a:p>
             <a:pPr lvl="1"/>
             <a:r>
-              <a:rPr lang="es-ES" smtClean="0"/>
+              <a:rPr lang="es-ES"/>
               <a:t>Segundo nivel</a:t>
             </a:r>
           </a:p>
           <a:p>
             <a:pPr lvl="2"/>
             <a:r>
-              <a:rPr lang="es-ES" smtClean="0"/>
+              <a:rPr lang="es-ES"/>
               <a:t>Tercer nivel</a:t>
             </a:r>
           </a:p>
           <a:p>
             <a:pPr lvl="3"/>
             <a:r>
-              <a:rPr lang="es-ES" smtClean="0"/>
+              <a:rPr lang="es-ES"/>
               <a:t>Cuarto nivel</a:t>
             </a:r>
           </a:p>
           <a:p>
             <a:pPr lvl="4"/>
             <a:r>
-              <a:rPr lang="es-ES" smtClean="0"/>
+              <a:rPr lang="es-ES"/>
               <a:t>Quinto nivel</a:t>
             </a:r>
             <a:endParaRPr lang="es-AR"/>
@@ -1964,7 +2088,7 @@
           <a:p>
             <a:fld id="{1D054745-723B-474A-B41C-4B47E748DED6}" type="datetimeFigureOut">
               <a:rPr lang="es-AR" smtClean="0"/>
-              <a:t>25/5/2018</a:t>
+              <a:t>30/5/2018</a:t>
             </a:fld>
             <a:endParaRPr lang="es-AR"/>
           </a:p>
@@ -2053,7 +2177,7 @@
           <a:lstStyle/>
           <a:p>
             <a:r>
-              <a:rPr lang="es-ES" smtClean="0"/>
+              <a:rPr lang="es-ES"/>
               <a:t>Haga clic para modificar el estilo de título del patrón</a:t>
             </a:r>
             <a:endParaRPr lang="es-AR"/>
@@ -2077,35 +2201,35 @@
           <a:p>
             <a:pPr lvl="0"/>
             <a:r>
-              <a:rPr lang="es-ES" smtClean="0"/>
+              <a:rPr lang="es-ES"/>
               <a:t>Haga clic para modificar el estilo de texto del patrón</a:t>
             </a:r>
           </a:p>
           <a:p>
             <a:pPr lvl="1"/>
             <a:r>
-              <a:rPr lang="es-ES" smtClean="0"/>
+              <a:rPr lang="es-ES"/>
               <a:t>Segundo nivel</a:t>
             </a:r>
           </a:p>
           <a:p>
             <a:pPr lvl="2"/>
             <a:r>
-              <a:rPr lang="es-ES" smtClean="0"/>
+              <a:rPr lang="es-ES"/>
               <a:t>Tercer nivel</a:t>
             </a:r>
           </a:p>
           <a:p>
             <a:pPr lvl="3"/>
             <a:r>
-              <a:rPr lang="es-ES" smtClean="0"/>
+              <a:rPr lang="es-ES"/>
               <a:t>Cuarto nivel</a:t>
             </a:r>
           </a:p>
           <a:p>
             <a:pPr lvl="4"/>
             <a:r>
-              <a:rPr lang="es-ES" smtClean="0"/>
+              <a:rPr lang="es-ES"/>
               <a:t>Quinto nivel</a:t>
             </a:r>
             <a:endParaRPr lang="es-AR"/>
@@ -2129,7 +2253,7 @@
           <a:p>
             <a:fld id="{1D054745-723B-474A-B41C-4B47E748DED6}" type="datetimeFigureOut">
               <a:rPr lang="es-AR" smtClean="0"/>
-              <a:t>25/5/2018</a:t>
+              <a:t>30/5/2018</a:t>
             </a:fld>
             <a:endParaRPr lang="es-AR"/>
           </a:p>
@@ -2227,7 +2351,7 @@
           </a:lstStyle>
           <a:p>
             <a:r>
-              <a:rPr lang="es-ES" smtClean="0"/>
+              <a:rPr lang="es-ES"/>
               <a:t>Haga clic para modificar el estilo de título del patrón</a:t>
             </a:r>
             <a:endParaRPr lang="es-AR"/>
@@ -2347,7 +2471,7 @@
           <a:p>
             <a:pPr lvl="0"/>
             <a:r>
-              <a:rPr lang="es-ES" smtClean="0"/>
+              <a:rPr lang="es-ES"/>
               <a:t>Haga clic para modificar el estilo de texto del patrón</a:t>
             </a:r>
           </a:p>
@@ -2370,7 +2494,7 @@
           <a:p>
             <a:fld id="{1D054745-723B-474A-B41C-4B47E748DED6}" type="datetimeFigureOut">
               <a:rPr lang="es-AR" smtClean="0"/>
-              <a:t>25/5/2018</a:t>
+              <a:t>30/5/2018</a:t>
             </a:fld>
             <a:endParaRPr lang="es-AR"/>
           </a:p>
@@ -2459,7 +2583,7 @@
           <a:lstStyle/>
           <a:p>
             <a:r>
-              <a:rPr lang="es-ES" smtClean="0"/>
+              <a:rPr lang="es-ES"/>
               <a:t>Haga clic para modificar el estilo de título del patrón</a:t>
             </a:r>
             <a:endParaRPr lang="es-AR"/>
@@ -2516,35 +2640,35 @@
           <a:p>
             <a:pPr lvl="0"/>
             <a:r>
-              <a:rPr lang="es-ES" smtClean="0"/>
+              <a:rPr lang="es-ES"/>
               <a:t>Haga clic para modificar el estilo de texto del patrón</a:t>
             </a:r>
           </a:p>
           <a:p>
             <a:pPr lvl="1"/>
             <a:r>
-              <a:rPr lang="es-ES" smtClean="0"/>
+              <a:rPr lang="es-ES"/>
               <a:t>Segundo nivel</a:t>
             </a:r>
           </a:p>
           <a:p>
             <a:pPr lvl="2"/>
             <a:r>
-              <a:rPr lang="es-ES" smtClean="0"/>
+              <a:rPr lang="es-ES"/>
               <a:t>Tercer nivel</a:t>
             </a:r>
           </a:p>
           <a:p>
             <a:pPr lvl="3"/>
             <a:r>
-              <a:rPr lang="es-ES" smtClean="0"/>
+              <a:rPr lang="es-ES"/>
               <a:t>Cuarto nivel</a:t>
             </a:r>
           </a:p>
           <a:p>
             <a:pPr lvl="4"/>
             <a:r>
-              <a:rPr lang="es-ES" smtClean="0"/>
+              <a:rPr lang="es-ES"/>
               <a:t>Quinto nivel</a:t>
             </a:r>
             <a:endParaRPr lang="es-AR"/>
@@ -2601,35 +2725,35 @@
           <a:p>
             <a:pPr lvl="0"/>
             <a:r>
-              <a:rPr lang="es-ES" smtClean="0"/>
+              <a:rPr lang="es-ES"/>
               <a:t>Haga clic para modificar el estilo de texto del patrón</a:t>
             </a:r>
           </a:p>
           <a:p>
             <a:pPr lvl="1"/>
             <a:r>
-              <a:rPr lang="es-ES" smtClean="0"/>
+              <a:rPr lang="es-ES"/>
               <a:t>Segundo nivel</a:t>
             </a:r>
           </a:p>
           <a:p>
             <a:pPr lvl="2"/>
             <a:r>
-              <a:rPr lang="es-ES" smtClean="0"/>
+              <a:rPr lang="es-ES"/>
               <a:t>Tercer nivel</a:t>
             </a:r>
           </a:p>
           <a:p>
             <a:pPr lvl="3"/>
             <a:r>
-              <a:rPr lang="es-ES" smtClean="0"/>
+              <a:rPr lang="es-ES"/>
               <a:t>Cuarto nivel</a:t>
             </a:r>
           </a:p>
           <a:p>
             <a:pPr lvl="4"/>
             <a:r>
-              <a:rPr lang="es-ES" smtClean="0"/>
+              <a:rPr lang="es-ES"/>
               <a:t>Quinto nivel</a:t>
             </a:r>
             <a:endParaRPr lang="es-AR"/>
@@ -2653,7 +2777,7 @@
           <a:p>
             <a:fld id="{1D054745-723B-474A-B41C-4B47E748DED6}" type="datetimeFigureOut">
               <a:rPr lang="es-AR" smtClean="0"/>
-              <a:t>25/5/2018</a:t>
+              <a:t>30/5/2018</a:t>
             </a:fld>
             <a:endParaRPr lang="es-AR"/>
           </a:p>
@@ -2746,7 +2870,7 @@
           </a:lstStyle>
           <a:p>
             <a:r>
-              <a:rPr lang="es-ES" smtClean="0"/>
+              <a:rPr lang="es-ES"/>
               <a:t>Haga clic para modificar el estilo de título del patrón</a:t>
             </a:r>
             <a:endParaRPr lang="es-AR"/>
@@ -2812,7 +2936,7 @@
           <a:p>
             <a:pPr lvl="0"/>
             <a:r>
-              <a:rPr lang="es-ES" smtClean="0"/>
+              <a:rPr lang="es-ES"/>
               <a:t>Haga clic para modificar el estilo de texto del patrón</a:t>
             </a:r>
           </a:p>
@@ -2868,35 +2992,35 @@
           <a:p>
             <a:pPr lvl="0"/>
             <a:r>
-              <a:rPr lang="es-ES" smtClean="0"/>
+              <a:rPr lang="es-ES"/>
               <a:t>Haga clic para modificar el estilo de texto del patrón</a:t>
             </a:r>
           </a:p>
           <a:p>
             <a:pPr lvl="1"/>
             <a:r>
-              <a:rPr lang="es-ES" smtClean="0"/>
+              <a:rPr lang="es-ES"/>
               <a:t>Segundo nivel</a:t>
             </a:r>
           </a:p>
           <a:p>
             <a:pPr lvl="2"/>
             <a:r>
-              <a:rPr lang="es-ES" smtClean="0"/>
+              <a:rPr lang="es-ES"/>
               <a:t>Tercer nivel</a:t>
             </a:r>
           </a:p>
           <a:p>
             <a:pPr lvl="3"/>
             <a:r>
-              <a:rPr lang="es-ES" smtClean="0"/>
+              <a:rPr lang="es-ES"/>
               <a:t>Cuarto nivel</a:t>
             </a:r>
           </a:p>
           <a:p>
             <a:pPr lvl="4"/>
             <a:r>
-              <a:rPr lang="es-ES" smtClean="0"/>
+              <a:rPr lang="es-ES"/>
               <a:t>Quinto nivel</a:t>
             </a:r>
             <a:endParaRPr lang="es-AR"/>
@@ -2962,7 +3086,7 @@
           <a:p>
             <a:pPr lvl="0"/>
             <a:r>
-              <a:rPr lang="es-ES" smtClean="0"/>
+              <a:rPr lang="es-ES"/>
               <a:t>Haga clic para modificar el estilo de texto del patrón</a:t>
             </a:r>
           </a:p>
@@ -3018,35 +3142,35 @@
           <a:p>
             <a:pPr lvl="0"/>
             <a:r>
-              <a:rPr lang="es-ES" smtClean="0"/>
+              <a:rPr lang="es-ES"/>
               <a:t>Haga clic para modificar el estilo de texto del patrón</a:t>
             </a:r>
           </a:p>
           <a:p>
             <a:pPr lvl="1"/>
             <a:r>
-              <a:rPr lang="es-ES" smtClean="0"/>
+              <a:rPr lang="es-ES"/>
               <a:t>Segundo nivel</a:t>
             </a:r>
           </a:p>
           <a:p>
             <a:pPr lvl="2"/>
             <a:r>
-              <a:rPr lang="es-ES" smtClean="0"/>
+              <a:rPr lang="es-ES"/>
               <a:t>Tercer nivel</a:t>
             </a:r>
           </a:p>
           <a:p>
             <a:pPr lvl="3"/>
             <a:r>
-              <a:rPr lang="es-ES" smtClean="0"/>
+              <a:rPr lang="es-ES"/>
               <a:t>Cuarto nivel</a:t>
             </a:r>
           </a:p>
           <a:p>
             <a:pPr lvl="4"/>
             <a:r>
-              <a:rPr lang="es-ES" smtClean="0"/>
+              <a:rPr lang="es-ES"/>
               <a:t>Quinto nivel</a:t>
             </a:r>
             <a:endParaRPr lang="es-AR"/>
@@ -3070,7 +3194,7 @@
           <a:p>
             <a:fld id="{1D054745-723B-474A-B41C-4B47E748DED6}" type="datetimeFigureOut">
               <a:rPr lang="es-AR" smtClean="0"/>
-              <a:t>25/5/2018</a:t>
+              <a:t>30/5/2018</a:t>
             </a:fld>
             <a:endParaRPr lang="es-AR"/>
           </a:p>
@@ -3159,7 +3283,7 @@
           <a:lstStyle/>
           <a:p>
             <a:r>
-              <a:rPr lang="es-ES" smtClean="0"/>
+              <a:rPr lang="es-ES"/>
               <a:t>Haga clic para modificar el estilo de título del patrón</a:t>
             </a:r>
             <a:endParaRPr lang="es-AR"/>
@@ -3183,7 +3307,7 @@
           <a:p>
             <a:fld id="{1D054745-723B-474A-B41C-4B47E748DED6}" type="datetimeFigureOut">
               <a:rPr lang="es-AR" smtClean="0"/>
-              <a:t>25/5/2018</a:t>
+              <a:t>30/5/2018</a:t>
             </a:fld>
             <a:endParaRPr lang="es-AR"/>
           </a:p>
@@ -3273,7 +3397,7 @@
           <a:p>
             <a:fld id="{1D054745-723B-474A-B41C-4B47E748DED6}" type="datetimeFigureOut">
               <a:rPr lang="es-AR" smtClean="0"/>
-              <a:t>25/5/2018</a:t>
+              <a:t>30/5/2018</a:t>
             </a:fld>
             <a:endParaRPr lang="es-AR"/>
           </a:p>
@@ -3371,7 +3495,7 @@
           </a:lstStyle>
           <a:p>
             <a:r>
-              <a:rPr lang="es-ES" smtClean="0"/>
+              <a:rPr lang="es-ES"/>
               <a:t>Haga clic para modificar el estilo de título del patrón</a:t>
             </a:r>
             <a:endParaRPr lang="es-AR"/>
@@ -3428,35 +3552,35 @@
           <a:p>
             <a:pPr lvl="0"/>
             <a:r>
-              <a:rPr lang="es-ES" smtClean="0"/>
+              <a:rPr lang="es-ES"/>
               <a:t>Haga clic para modificar el estilo de texto del patrón</a:t>
             </a:r>
           </a:p>
           <a:p>
             <a:pPr lvl="1"/>
             <a:r>
-              <a:rPr lang="es-ES" smtClean="0"/>
+              <a:rPr lang="es-ES"/>
               <a:t>Segundo nivel</a:t>
             </a:r>
           </a:p>
           <a:p>
             <a:pPr lvl="2"/>
             <a:r>
-              <a:rPr lang="es-ES" smtClean="0"/>
+              <a:rPr lang="es-ES"/>
               <a:t>Tercer nivel</a:t>
             </a:r>
           </a:p>
           <a:p>
             <a:pPr lvl="3"/>
             <a:r>
-              <a:rPr lang="es-ES" smtClean="0"/>
+              <a:rPr lang="es-ES"/>
               <a:t>Cuarto nivel</a:t>
             </a:r>
           </a:p>
           <a:p>
             <a:pPr lvl="4"/>
             <a:r>
-              <a:rPr lang="es-ES" smtClean="0"/>
+              <a:rPr lang="es-ES"/>
               <a:t>Quinto nivel</a:t>
             </a:r>
             <a:endParaRPr lang="es-AR"/>
@@ -3522,7 +3646,7 @@
           <a:p>
             <a:pPr lvl="0"/>
             <a:r>
-              <a:rPr lang="es-ES" smtClean="0"/>
+              <a:rPr lang="es-ES"/>
               <a:t>Haga clic para modificar el estilo de texto del patrón</a:t>
             </a:r>
           </a:p>
@@ -3545,7 +3669,7 @@
           <a:p>
             <a:fld id="{1D054745-723B-474A-B41C-4B47E748DED6}" type="datetimeFigureOut">
               <a:rPr lang="es-AR" smtClean="0"/>
-              <a:t>25/5/2018</a:t>
+              <a:t>30/5/2018</a:t>
             </a:fld>
             <a:endParaRPr lang="es-AR"/>
           </a:p>
@@ -3643,7 +3767,7 @@
           </a:lstStyle>
           <a:p>
             <a:r>
-              <a:rPr lang="es-ES" smtClean="0"/>
+              <a:rPr lang="es-ES"/>
               <a:t>Haga clic para modificar el estilo de título del patrón</a:t>
             </a:r>
             <a:endParaRPr lang="es-AR"/>
@@ -3770,7 +3894,7 @@
           <a:p>
             <a:pPr lvl="0"/>
             <a:r>
-              <a:rPr lang="es-ES" smtClean="0"/>
+              <a:rPr lang="es-ES"/>
               <a:t>Haga clic para modificar el estilo de texto del patrón</a:t>
             </a:r>
           </a:p>
@@ -3793,7 +3917,7 @@
           <a:p>
             <a:fld id="{1D054745-723B-474A-B41C-4B47E748DED6}" type="datetimeFigureOut">
               <a:rPr lang="es-AR" smtClean="0"/>
-              <a:t>25/5/2018</a:t>
+              <a:t>30/5/2018</a:t>
             </a:fld>
             <a:endParaRPr lang="es-AR"/>
           </a:p>
@@ -3902,7 +4026,7 @@
           <a:lstStyle/>
           <a:p>
             <a:r>
-              <a:rPr lang="es-ES" smtClean="0"/>
+              <a:rPr lang="es-ES"/>
               <a:t>Haga clic para modificar el estilo de título del patrón</a:t>
             </a:r>
             <a:endParaRPr lang="es-AR"/>
@@ -3936,35 +4060,35 @@
           <a:p>
             <a:pPr lvl="0"/>
             <a:r>
-              <a:rPr lang="es-ES" smtClean="0"/>
+              <a:rPr lang="es-ES"/>
               <a:t>Haga clic para modificar el estilo de texto del patrón</a:t>
             </a:r>
           </a:p>
           <a:p>
             <a:pPr lvl="1"/>
             <a:r>
-              <a:rPr lang="es-ES" smtClean="0"/>
+              <a:rPr lang="es-ES"/>
               <a:t>Segundo nivel</a:t>
             </a:r>
           </a:p>
           <a:p>
             <a:pPr lvl="2"/>
             <a:r>
-              <a:rPr lang="es-ES" smtClean="0"/>
+              <a:rPr lang="es-ES"/>
               <a:t>Tercer nivel</a:t>
             </a:r>
           </a:p>
           <a:p>
             <a:pPr lvl="3"/>
             <a:r>
-              <a:rPr lang="es-ES" smtClean="0"/>
+              <a:rPr lang="es-ES"/>
               <a:t>Cuarto nivel</a:t>
             </a:r>
           </a:p>
           <a:p>
             <a:pPr lvl="4"/>
             <a:r>
-              <a:rPr lang="es-ES" smtClean="0"/>
+              <a:rPr lang="es-ES"/>
               <a:t>Quinto nivel</a:t>
             </a:r>
             <a:endParaRPr lang="es-AR"/>
@@ -4006,7 +4130,7 @@
           <a:p>
             <a:fld id="{1D054745-723B-474A-B41C-4B47E748DED6}" type="datetimeFigureOut">
               <a:rPr lang="es-AR" smtClean="0"/>
-              <a:t>25/5/2018</a:t>
+              <a:t>30/5/2018</a:t>
             </a:fld>
             <a:endParaRPr lang="es-AR"/>
           </a:p>
@@ -4397,10 +4521,9 @@
           <a:lstStyle/>
           <a:p>
             <a:r>
-              <a:rPr lang="es-AR" dirty="0" smtClean="0"/>
+              <a:rPr lang="es-AR" dirty="0"/>
               <a:t>Introducción </a:t>
             </a:r>
-            <a:endParaRPr lang="es-AR" dirty="0"/>
           </a:p>
         </p:txBody>
       </p:sp>
@@ -4427,10 +4550,9 @@
           <a:lstStyle/>
           <a:p>
             <a:r>
-              <a:rPr lang="es-AR" sz="4400" dirty="0" smtClean="0"/>
+              <a:rPr lang="es-AR" sz="4400" dirty="0"/>
               <a:t>Origen</a:t>
             </a:r>
-            <a:endParaRPr lang="es-AR" sz="4400" dirty="0"/>
           </a:p>
         </p:txBody>
       </p:sp>
@@ -4545,10 +4667,9 @@
           <a:lstStyle/>
           <a:p>
             <a:r>
-              <a:rPr lang="es-AR" sz="4800" dirty="0" smtClean="0"/>
+              <a:rPr lang="es-AR" sz="4800" dirty="0"/>
               <a:t>DEL</a:t>
             </a:r>
-            <a:endParaRPr lang="es-AR" sz="4800" dirty="0"/>
           </a:p>
         </p:txBody>
       </p:sp>
@@ -4575,10 +4696,9 @@
           <a:lstStyle/>
           <a:p>
             <a:r>
-              <a:rPr lang="es-AR" sz="4800" dirty="0" smtClean="0"/>
+              <a:rPr lang="es-AR" sz="4800" dirty="0"/>
               <a:t>SOL</a:t>
             </a:r>
-            <a:endParaRPr lang="es-AR" sz="4800" dirty="0"/>
           </a:p>
         </p:txBody>
       </p:sp>
@@ -4679,37 +4799,20 @@
       </p:grpSpPr>
       <p:sp>
         <p:nvSpPr>
-          <p:cNvPr id="2" name="1 Título"/>
-          <p:cNvSpPr>
-            <a:spLocks noGrp="1"/>
-          </p:cNvSpPr>
-          <p:nvPr>
-            <p:ph type="title"/>
-          </p:nvPr>
-        </p:nvSpPr>
-        <p:spPr/>
-        <p:txBody>
-          <a:bodyPr/>
-          <a:lstStyle/>
-          <a:p>
-            <a:r>
-              <a:rPr lang="es-AR" dirty="0" smtClean="0"/>
-              <a:t>Comparativa</a:t>
-            </a:r>
-            <a:endParaRPr lang="es-AR" dirty="0"/>
-          </a:p>
-        </p:txBody>
-      </p:sp>
-      <p:sp>
-        <p:nvSpPr>
-          <p:cNvPr id="3" name="2 CuadroTexto"/>
+          <p:cNvPr id="3" name="2 CuadroTexto">
+            <a:extLst>
+              <a:ext uri="{FF2B5EF4-FFF2-40B4-BE49-F238E27FC236}">
+                <a16:creationId xmlns:a16="http://schemas.microsoft.com/office/drawing/2014/main" id="{3996A7BD-CC5D-4008-AA49-523AEC013904}"/>
+              </a:ext>
+            </a:extLst>
+          </p:cNvPr>
           <p:cNvSpPr txBox="1"/>
           <p:nvPr/>
         </p:nvSpPr>
         <p:spPr>
           <a:xfrm>
-            <a:off x="714348" y="1500174"/>
-            <a:ext cx="4071966" cy="369332"/>
+            <a:off x="571472" y="928670"/>
+            <a:ext cx="4288560" cy="461665"/>
           </a:xfrm>
           <a:prstGeom prst="rect">
             <a:avLst/>
@@ -4723,27 +4826,32 @@
           <a:lstStyle/>
           <a:p>
             <a:r>
-              <a:rPr lang="es-AR" dirty="0" smtClean="0"/>
-              <a:t>LUA vs </a:t>
-            </a:r>
-            <a:r>
-              <a:rPr lang="es-AR" dirty="0" err="1" smtClean="0"/>
-              <a:t>Python</a:t>
-            </a:r>
-            <a:endParaRPr lang="es-AR" dirty="0"/>
-          </a:p>
-        </p:txBody>
-      </p:sp>
-      <p:sp>
-        <p:nvSpPr>
-          <p:cNvPr id="4" name="3 CuadroTexto"/>
+              <a:rPr lang="es-AR" sz="2400" u="sng" dirty="0" err="1"/>
+              <a:t>Arrays</a:t>
+            </a:r>
+            <a:r>
+              <a:rPr lang="es-AR" sz="2400" u="sng" dirty="0"/>
+              <a:t>, Listas y Secuencias</a:t>
+            </a:r>
+          </a:p>
+        </p:txBody>
+      </p:sp>
+      <p:sp>
+        <p:nvSpPr>
+          <p:cNvPr id="4" name="CuadroTexto 3">
+            <a:extLst>
+              <a:ext uri="{FF2B5EF4-FFF2-40B4-BE49-F238E27FC236}">
+                <a16:creationId xmlns:a16="http://schemas.microsoft.com/office/drawing/2014/main" id="{114B1443-20DC-49E6-ADA4-17C6005CD2FD}"/>
+              </a:ext>
+            </a:extLst>
+          </p:cNvPr>
           <p:cNvSpPr txBox="1"/>
           <p:nvPr/>
         </p:nvSpPr>
         <p:spPr>
           <a:xfrm>
-            <a:off x="714348" y="2071678"/>
-            <a:ext cx="4071966" cy="369332"/>
+            <a:off x="845724" y="1659970"/>
+            <a:ext cx="7992888" cy="923330"/>
           </a:xfrm>
           <a:prstGeom prst="rect">
             <a:avLst/>
@@ -4757,23 +4865,46 @@
           <a:lstStyle/>
           <a:p>
             <a:r>
-              <a:rPr lang="es-AR" dirty="0" smtClean="0"/>
-              <a:t>LUA vs GO</a:t>
-            </a:r>
-            <a:endParaRPr lang="es-AR" dirty="0"/>
-          </a:p>
-        </p:txBody>
-      </p:sp>
-      <p:sp>
-        <p:nvSpPr>
-          <p:cNvPr id="5" name="4 CuadroTexto"/>
+              <a:rPr lang="es-ES" dirty="0"/>
+              <a:t>Para representar listas o </a:t>
+            </a:r>
+            <a:r>
+              <a:rPr lang="es-ES" dirty="0" err="1"/>
+              <a:t>arrays</a:t>
+            </a:r>
+            <a:r>
+              <a:rPr lang="es-ES" dirty="0"/>
+              <a:t>, se utiliza una tabla y se accede a cada valor con </a:t>
+            </a:r>
+          </a:p>
+          <a:p>
+            <a:r>
+              <a:rPr lang="es-ES" dirty="0" err="1"/>
+              <a:t>key</a:t>
+            </a:r>
+            <a:r>
+              <a:rPr lang="es-ES" dirty="0"/>
+              <a:t> = numero, comenzando el array con 1. Si no tienen agujeros se las llaman secuencia.</a:t>
+            </a:r>
+          </a:p>
+        </p:txBody>
+      </p:sp>
+      <p:sp>
+        <p:nvSpPr>
+          <p:cNvPr id="6" name="CuadroTexto 5">
+            <a:extLst>
+              <a:ext uri="{FF2B5EF4-FFF2-40B4-BE49-F238E27FC236}">
+                <a16:creationId xmlns:a16="http://schemas.microsoft.com/office/drawing/2014/main" id="{2177A13C-F0A9-459D-98E1-08B8D30D1FBC}"/>
+              </a:ext>
+            </a:extLst>
+          </p:cNvPr>
           <p:cNvSpPr txBox="1"/>
           <p:nvPr/>
         </p:nvSpPr>
         <p:spPr>
           <a:xfrm>
-            <a:off x="714348" y="2571744"/>
-            <a:ext cx="4071966" cy="369332"/>
+            <a:off x="640751" y="5962242"/>
+            <a:ext cx="4628896" cy="369332"/>
           </a:xfrm>
           <a:prstGeom prst="rect">
             <a:avLst/>
@@ -4781,54 +4912,62 @@
           <a:noFill/>
         </p:spPr>
         <p:txBody>
-          <a:bodyPr wrap="square" rtlCol="0">
+          <a:bodyPr wrap="none" rtlCol="0">
             <a:spAutoFit/>
           </a:bodyPr>
           <a:lstStyle/>
           <a:p>
             <a:r>
-              <a:rPr lang="es-AR" dirty="0" smtClean="0"/>
-              <a:t>LUA vs Perl</a:t>
-            </a:r>
-            <a:endParaRPr lang="es-AR" dirty="0"/>
-          </a:p>
-        </p:txBody>
-      </p:sp>
-      <p:sp>
-        <p:nvSpPr>
-          <p:cNvPr id="6" name="5 CuadroTexto"/>
-          <p:cNvSpPr txBox="1"/>
+              <a:rPr lang="es-ES" dirty="0"/>
+              <a:t>También te ofrece la función </a:t>
+            </a:r>
+            <a:r>
+              <a:rPr lang="es-ES" dirty="0" err="1"/>
+              <a:t>lenght</a:t>
+            </a:r>
+            <a:r>
+              <a:rPr lang="es-ES" dirty="0"/>
+              <a:t> como #lista</a:t>
+            </a:r>
+          </a:p>
+        </p:txBody>
+      </p:sp>
+      <p:pic>
+        <p:nvPicPr>
+          <p:cNvPr id="7" name="Imagen 6">
+            <a:extLst>
+              <a:ext uri="{FF2B5EF4-FFF2-40B4-BE49-F238E27FC236}">
+                <a16:creationId xmlns:a16="http://schemas.microsoft.com/office/drawing/2014/main" id="{5596617A-9A6A-4E5C-AA07-614786EF26A9}"/>
+              </a:ext>
+            </a:extLst>
+          </p:cNvPr>
+          <p:cNvPicPr>
+            <a:picLocks noChangeAspect="1"/>
+          </p:cNvPicPr>
           <p:nvPr/>
-        </p:nvSpPr>
-        <p:spPr>
-          <a:xfrm>
-            <a:off x="714348" y="3143248"/>
-            <a:ext cx="4071966" cy="369332"/>
+        </p:nvPicPr>
+        <p:blipFill>
+          <a:blip r:embed="rId3"/>
+          <a:stretch>
+            <a:fillRect/>
+          </a:stretch>
+        </p:blipFill>
+        <p:spPr>
+          <a:xfrm>
+            <a:off x="638975" y="2852936"/>
+            <a:ext cx="8204316" cy="3024336"/>
           </a:xfrm>
           <a:prstGeom prst="rect">
             <a:avLst/>
           </a:prstGeom>
-          <a:noFill/>
-        </p:spPr>
-        <p:txBody>
-          <a:bodyPr wrap="square" rtlCol="0">
-            <a:spAutoFit/>
-          </a:bodyPr>
-          <a:lstStyle/>
-          <a:p>
-            <a:r>
-              <a:rPr lang="es-AR" dirty="0" smtClean="0"/>
-              <a:t>LUA vs </a:t>
-            </a:r>
-            <a:r>
-              <a:rPr lang="es-AR" dirty="0" err="1" smtClean="0"/>
-              <a:t>Scheme</a:t>
-            </a:r>
-            <a:endParaRPr lang="es-AR" dirty="0"/>
-          </a:p>
-        </p:txBody>
-      </p:sp>
+        </p:spPr>
+      </p:pic>
     </p:spTree>
+    <p:extLst>
+      <p:ext uri="{BB962C8B-B14F-4D97-AF65-F5344CB8AC3E}">
+        <p14:creationId xmlns:p14="http://schemas.microsoft.com/office/powerpoint/2010/main" val="4255249950"/>
+      </p:ext>
+    </p:extLst>
   </p:cSld>
   <p:clrMapOvr>
     <a:masterClrMapping/>
@@ -4855,37 +4994,14 @@
       </p:grpSpPr>
       <p:sp>
         <p:nvSpPr>
-          <p:cNvPr id="2" name="1 Título"/>
-          <p:cNvSpPr>
-            <a:spLocks noGrp="1"/>
-          </p:cNvSpPr>
-          <p:nvPr>
-            <p:ph type="title"/>
-          </p:nvPr>
-        </p:nvSpPr>
-        <p:spPr/>
-        <p:txBody>
-          <a:bodyPr/>
-          <a:lstStyle/>
-          <a:p>
-            <a:r>
-              <a:rPr lang="es-AR" dirty="0" smtClean="0"/>
-              <a:t>Caso de estudio</a:t>
-            </a:r>
-            <a:endParaRPr lang="es-AR" dirty="0"/>
-          </a:p>
-        </p:txBody>
-      </p:sp>
-      <p:sp>
-        <p:nvSpPr>
           <p:cNvPr id="3" name="2 CuadroTexto"/>
           <p:cNvSpPr txBox="1"/>
           <p:nvPr/>
         </p:nvSpPr>
         <p:spPr>
           <a:xfrm>
-            <a:off x="1142976" y="1857364"/>
-            <a:ext cx="2083071" cy="369332"/>
+            <a:off x="714348" y="642918"/>
+            <a:ext cx="3714776" cy="461665"/>
           </a:xfrm>
           <a:prstGeom prst="rect">
             <a:avLst/>
@@ -4893,15 +5009,160 @@
           <a:noFill/>
         </p:spPr>
         <p:txBody>
+          <a:bodyPr wrap="square" rtlCol="0">
+            <a:spAutoFit/>
+          </a:bodyPr>
+          <a:lstStyle/>
+          <a:p>
+            <a:r>
+              <a:rPr lang="es-AR" sz="2400" dirty="0"/>
+              <a:t>Características avanzadas </a:t>
+            </a:r>
+          </a:p>
+        </p:txBody>
+      </p:sp>
+      <p:sp>
+        <p:nvSpPr>
+          <p:cNvPr id="4" name="3 CuadroTexto"/>
+          <p:cNvSpPr txBox="1"/>
+          <p:nvPr/>
+        </p:nvSpPr>
+        <p:spPr>
+          <a:xfrm>
+            <a:off x="1214414" y="2071678"/>
+            <a:ext cx="2414507" cy="1477328"/>
+          </a:xfrm>
+          <a:prstGeom prst="rect">
+            <a:avLst/>
+          </a:prstGeom>
+          <a:noFill/>
+        </p:spPr>
+        <p:txBody>
           <a:bodyPr wrap="none" rtlCol="0">
             <a:spAutoFit/>
           </a:bodyPr>
           <a:lstStyle/>
           <a:p>
             <a:r>
-              <a:rPr lang="es-AR" dirty="0" smtClean="0"/>
-              <a:t>HAY QUE BUSCARLO</a:t>
-            </a:r>
+              <a:rPr lang="es-AR" dirty="0" err="1"/>
+              <a:t>Garbage</a:t>
+            </a:r>
+            <a:r>
+              <a:rPr lang="es-AR" dirty="0"/>
+              <a:t> </a:t>
+            </a:r>
+            <a:r>
+              <a:rPr lang="es-AR" dirty="0" err="1"/>
+              <a:t>Collector</a:t>
+            </a:r>
+            <a:endParaRPr lang="es-AR" dirty="0"/>
+          </a:p>
+          <a:p>
+            <a:endParaRPr lang="es-AR" dirty="0"/>
+          </a:p>
+          <a:p>
+            <a:r>
+              <a:rPr lang="es-AR" dirty="0" err="1"/>
+              <a:t>Closures</a:t>
+            </a:r>
+            <a:endParaRPr lang="es-AR" dirty="0"/>
+          </a:p>
+          <a:p>
+            <a:endParaRPr lang="es-AR" dirty="0"/>
+          </a:p>
+          <a:p>
+            <a:r>
+              <a:rPr lang="es-AR" dirty="0"/>
+              <a:t>Funciones de 1era clase</a:t>
+            </a:r>
+          </a:p>
+        </p:txBody>
+      </p:sp>
+      <p:sp>
+        <p:nvSpPr>
+          <p:cNvPr id="5" name="4 CuadroTexto"/>
+          <p:cNvSpPr txBox="1"/>
+          <p:nvPr/>
+        </p:nvSpPr>
+        <p:spPr>
+          <a:xfrm>
+            <a:off x="1142976" y="3429000"/>
+            <a:ext cx="7500990" cy="3139321"/>
+          </a:xfrm>
+          <a:prstGeom prst="rect">
+            <a:avLst/>
+          </a:prstGeom>
+          <a:noFill/>
+        </p:spPr>
+        <p:txBody>
+          <a:bodyPr wrap="square" rtlCol="0">
+            <a:spAutoFit/>
+          </a:bodyPr>
+          <a:lstStyle/>
+          <a:p>
+            <a:endParaRPr lang="es-AR" dirty="0"/>
+          </a:p>
+          <a:p>
+            <a:r>
+              <a:rPr lang="es-AR" dirty="0"/>
+              <a:t>Control de Flujos</a:t>
+            </a:r>
+          </a:p>
+          <a:p>
+            <a:endParaRPr lang="es-AR" dirty="0"/>
+          </a:p>
+          <a:p>
+            <a:br>
+              <a:rPr lang="es-AR" dirty="0"/>
+            </a:br>
+            <a:r>
+              <a:rPr lang="es-AR" dirty="0"/>
+              <a:t>Pasaje de </a:t>
+            </a:r>
+            <a:r>
+              <a:rPr lang="es-AR" dirty="0" err="1"/>
+              <a:t>Parametros</a:t>
+            </a:r>
+            <a:r>
+              <a:rPr lang="es-AR" dirty="0"/>
+              <a:t>:</a:t>
+            </a:r>
+          </a:p>
+          <a:p>
+            <a:endParaRPr lang="es-AR" dirty="0"/>
+          </a:p>
+          <a:p>
+            <a:r>
+              <a:rPr lang="es-AR" dirty="0" err="1"/>
+              <a:t>Parametros</a:t>
+            </a:r>
+            <a:r>
+              <a:rPr lang="es-AR" dirty="0"/>
+              <a:t> como variables locales que se inicializan con lo que vos le pasas</a:t>
+            </a:r>
+          </a:p>
+          <a:p>
+            <a:endParaRPr lang="es-AR" dirty="0"/>
+          </a:p>
+          <a:p>
+            <a:r>
+              <a:rPr lang="es-AR" dirty="0" err="1"/>
+              <a:t>Safe</a:t>
+            </a:r>
+            <a:r>
+              <a:rPr lang="es-AR" dirty="0"/>
+              <a:t> </a:t>
+            </a:r>
+            <a:r>
+              <a:rPr lang="es-AR" dirty="0" err="1"/>
+              <a:t>naavigation</a:t>
+            </a:r>
+            <a:br>
+              <a:rPr lang="es-AR" dirty="0"/>
+            </a:br>
+            <a:endParaRPr lang="es-AR" dirty="0"/>
+          </a:p>
+          <a:p>
             <a:endParaRPr lang="es-AR" dirty="0"/>
           </a:p>
         </p:txBody>
@@ -4947,10 +5208,9 @@
           <a:lstStyle/>
           <a:p>
             <a:r>
-              <a:rPr lang="es-AR" dirty="0" smtClean="0"/>
-              <a:t>Estadísticas</a:t>
-            </a:r>
-            <a:endParaRPr lang="es-AR" dirty="0"/>
+              <a:rPr lang="es-AR" dirty="0"/>
+              <a:t>Comparativa</a:t>
+            </a:r>
           </a:p>
         </p:txBody>
       </p:sp>
@@ -4962,8 +5222,8 @@
         </p:nvSpPr>
         <p:spPr>
           <a:xfrm>
-            <a:off x="857224" y="1428736"/>
-            <a:ext cx="4572032" cy="369332"/>
+            <a:off x="714348" y="1500174"/>
+            <a:ext cx="4071966" cy="369332"/>
           </a:xfrm>
           <a:prstGeom prst="rect">
             <a:avLst/>
@@ -4977,8 +5237,12 @@
           <a:lstStyle/>
           <a:p>
             <a:r>
-              <a:rPr lang="es-AR" dirty="0" smtClean="0"/>
-              <a:t>Evolución del lenguaje</a:t>
+              <a:rPr lang="es-AR" dirty="0"/>
+              <a:t>LUA vs </a:t>
+            </a:r>
+            <a:r>
+              <a:rPr lang="es-AR" dirty="0" err="1"/>
+              <a:t>Python</a:t>
             </a:r>
             <a:endParaRPr lang="es-AR" dirty="0"/>
           </a:p>
@@ -4992,8 +5256,8 @@
         </p:nvSpPr>
         <p:spPr>
           <a:xfrm>
-            <a:off x="785786" y="2143116"/>
-            <a:ext cx="3929090" cy="369332"/>
+            <a:off x="714348" y="2071678"/>
+            <a:ext cx="4071966" cy="369332"/>
           </a:xfrm>
           <a:prstGeom prst="rect">
             <a:avLst/>
@@ -5007,8 +5271,70 @@
           <a:lstStyle/>
           <a:p>
             <a:r>
-              <a:rPr lang="es-AR" dirty="0" err="1" smtClean="0"/>
-              <a:t>Frameworks</a:t>
+              <a:rPr lang="es-AR" dirty="0"/>
+              <a:t>LUA vs GO</a:t>
+            </a:r>
+          </a:p>
+        </p:txBody>
+      </p:sp>
+      <p:sp>
+        <p:nvSpPr>
+          <p:cNvPr id="5" name="4 CuadroTexto"/>
+          <p:cNvSpPr txBox="1"/>
+          <p:nvPr/>
+        </p:nvSpPr>
+        <p:spPr>
+          <a:xfrm>
+            <a:off x="714348" y="2571744"/>
+            <a:ext cx="4071966" cy="369332"/>
+          </a:xfrm>
+          <a:prstGeom prst="rect">
+            <a:avLst/>
+          </a:prstGeom>
+          <a:noFill/>
+        </p:spPr>
+        <p:txBody>
+          <a:bodyPr wrap="square" rtlCol="0">
+            <a:spAutoFit/>
+          </a:bodyPr>
+          <a:lstStyle/>
+          <a:p>
+            <a:r>
+              <a:rPr lang="es-AR" dirty="0"/>
+              <a:t>LUA vs Perl</a:t>
+            </a:r>
+          </a:p>
+        </p:txBody>
+      </p:sp>
+      <p:sp>
+        <p:nvSpPr>
+          <p:cNvPr id="6" name="5 CuadroTexto"/>
+          <p:cNvSpPr txBox="1"/>
+          <p:nvPr/>
+        </p:nvSpPr>
+        <p:spPr>
+          <a:xfrm>
+            <a:off x="714348" y="3143248"/>
+            <a:ext cx="4071966" cy="369332"/>
+          </a:xfrm>
+          <a:prstGeom prst="rect">
+            <a:avLst/>
+          </a:prstGeom>
+          <a:noFill/>
+        </p:spPr>
+        <p:txBody>
+          <a:bodyPr wrap="square" rtlCol="0">
+            <a:spAutoFit/>
+          </a:bodyPr>
+          <a:lstStyle/>
+          <a:p>
+            <a:r>
+              <a:rPr lang="es-AR" dirty="0"/>
+              <a:t>LUA vs </a:t>
+            </a:r>
+            <a:r>
+              <a:rPr lang="es-AR" dirty="0" err="1"/>
+              <a:t>Scheme</a:t>
             </a:r>
             <a:endParaRPr lang="es-AR" dirty="0"/>
           </a:p>
@@ -5055,10 +5381,9 @@
           <a:lstStyle/>
           <a:p>
             <a:r>
-              <a:rPr lang="es-AR" dirty="0" err="1" smtClean="0"/>
-              <a:t>Conclusion</a:t>
-            </a:r>
-            <a:endParaRPr lang="es-AR" dirty="0"/>
+              <a:rPr lang="es-AR" dirty="0"/>
+              <a:t>Caso de estudio</a:t>
+            </a:r>
           </a:p>
         </p:txBody>
       </p:sp>
@@ -5070,8 +5395,8 @@
         </p:nvSpPr>
         <p:spPr>
           <a:xfrm>
-            <a:off x="1071538" y="1643050"/>
-            <a:ext cx="3929090" cy="1077218"/>
+            <a:off x="1142976" y="1857364"/>
+            <a:ext cx="2083071" cy="369332"/>
           </a:xfrm>
           <a:prstGeom prst="rect">
             <a:avLst/>
@@ -5079,16 +5404,198 @@
           <a:noFill/>
         </p:spPr>
         <p:txBody>
+          <a:bodyPr wrap="none" rtlCol="0">
+            <a:spAutoFit/>
+          </a:bodyPr>
+          <a:lstStyle/>
+          <a:p>
+            <a:r>
+              <a:rPr lang="es-AR" dirty="0"/>
+              <a:t>HAY QUE BUSCARLO</a:t>
+            </a:r>
+          </a:p>
+        </p:txBody>
+      </p:sp>
+    </p:spTree>
+  </p:cSld>
+  <p:clrMapOvr>
+    <a:masterClrMapping/>
+  </p:clrMapOvr>
+</p:sld>
+</file>
+
+<file path=ppt/slides/slide14.xml><?xml version="1.0" encoding="utf-8"?>
+<p:sld xmlns:a="http://schemas.openxmlformats.org/drawingml/2006/main" xmlns:r="http://schemas.openxmlformats.org/officeDocument/2006/relationships" xmlns:p="http://schemas.openxmlformats.org/presentationml/2006/main">
+  <p:cSld>
+    <p:spTree>
+      <p:nvGrpSpPr>
+        <p:cNvPr id="1" name=""/>
+        <p:cNvGrpSpPr/>
+        <p:nvPr/>
+      </p:nvGrpSpPr>
+      <p:grpSpPr>
+        <a:xfrm>
+          <a:off x="0" y="0"/>
+          <a:ext cx="0" cy="0"/>
+          <a:chOff x="0" y="0"/>
+          <a:chExt cx="0" cy="0"/>
+        </a:xfrm>
+      </p:grpSpPr>
+      <p:sp>
+        <p:nvSpPr>
+          <p:cNvPr id="2" name="1 Título"/>
+          <p:cNvSpPr>
+            <a:spLocks noGrp="1"/>
+          </p:cNvSpPr>
+          <p:nvPr>
+            <p:ph type="title"/>
+          </p:nvPr>
+        </p:nvSpPr>
+        <p:spPr/>
+        <p:txBody>
+          <a:bodyPr/>
+          <a:lstStyle/>
+          <a:p>
+            <a:r>
+              <a:rPr lang="es-AR" dirty="0"/>
+              <a:t>Estadísticas</a:t>
+            </a:r>
+          </a:p>
+        </p:txBody>
+      </p:sp>
+      <p:sp>
+        <p:nvSpPr>
+          <p:cNvPr id="3" name="2 CuadroTexto"/>
+          <p:cNvSpPr txBox="1"/>
+          <p:nvPr/>
+        </p:nvSpPr>
+        <p:spPr>
+          <a:xfrm>
+            <a:off x="857224" y="1428736"/>
+            <a:ext cx="4572032" cy="369332"/>
+          </a:xfrm>
+          <a:prstGeom prst="rect">
+            <a:avLst/>
+          </a:prstGeom>
+          <a:noFill/>
+        </p:spPr>
+        <p:txBody>
           <a:bodyPr wrap="square" rtlCol="0">
             <a:spAutoFit/>
           </a:bodyPr>
           <a:lstStyle/>
           <a:p>
             <a:r>
-              <a:rPr lang="es-AR" sz="3200" dirty="0" smtClean="0"/>
+              <a:rPr lang="es-AR" dirty="0"/>
+              <a:t>Evolución del lenguaje</a:t>
+            </a:r>
+          </a:p>
+        </p:txBody>
+      </p:sp>
+      <p:sp>
+        <p:nvSpPr>
+          <p:cNvPr id="4" name="3 CuadroTexto"/>
+          <p:cNvSpPr txBox="1"/>
+          <p:nvPr/>
+        </p:nvSpPr>
+        <p:spPr>
+          <a:xfrm>
+            <a:off x="785786" y="2143116"/>
+            <a:ext cx="3929090" cy="369332"/>
+          </a:xfrm>
+          <a:prstGeom prst="rect">
+            <a:avLst/>
+          </a:prstGeom>
+          <a:noFill/>
+        </p:spPr>
+        <p:txBody>
+          <a:bodyPr wrap="square" rtlCol="0">
+            <a:spAutoFit/>
+          </a:bodyPr>
+          <a:lstStyle/>
+          <a:p>
+            <a:r>
+              <a:rPr lang="es-AR" dirty="0" err="1"/>
+              <a:t>Frameworks</a:t>
+            </a:r>
+            <a:endParaRPr lang="es-AR" dirty="0"/>
+          </a:p>
+        </p:txBody>
+      </p:sp>
+    </p:spTree>
+  </p:cSld>
+  <p:clrMapOvr>
+    <a:masterClrMapping/>
+  </p:clrMapOvr>
+</p:sld>
+</file>
+
+<file path=ppt/slides/slide15.xml><?xml version="1.0" encoding="utf-8"?>
+<p:sld xmlns:a="http://schemas.openxmlformats.org/drawingml/2006/main" xmlns:r="http://schemas.openxmlformats.org/officeDocument/2006/relationships" xmlns:p="http://schemas.openxmlformats.org/presentationml/2006/main">
+  <p:cSld>
+    <p:spTree>
+      <p:nvGrpSpPr>
+        <p:cNvPr id="1" name=""/>
+        <p:cNvGrpSpPr/>
+        <p:nvPr/>
+      </p:nvGrpSpPr>
+      <p:grpSpPr>
+        <a:xfrm>
+          <a:off x="0" y="0"/>
+          <a:ext cx="0" cy="0"/>
+          <a:chOff x="0" y="0"/>
+          <a:chExt cx="0" cy="0"/>
+        </a:xfrm>
+      </p:grpSpPr>
+      <p:sp>
+        <p:nvSpPr>
+          <p:cNvPr id="2" name="1 Título"/>
+          <p:cNvSpPr>
+            <a:spLocks noGrp="1"/>
+          </p:cNvSpPr>
+          <p:nvPr>
+            <p:ph type="title"/>
+          </p:nvPr>
+        </p:nvSpPr>
+        <p:spPr/>
+        <p:txBody>
+          <a:bodyPr/>
+          <a:lstStyle/>
+          <a:p>
+            <a:r>
+              <a:rPr lang="es-AR" dirty="0" err="1"/>
+              <a:t>Conclusion</a:t>
+            </a:r>
+            <a:endParaRPr lang="es-AR" dirty="0"/>
+          </a:p>
+        </p:txBody>
+      </p:sp>
+      <p:sp>
+        <p:nvSpPr>
+          <p:cNvPr id="3" name="2 CuadroTexto"/>
+          <p:cNvSpPr txBox="1"/>
+          <p:nvPr/>
+        </p:nvSpPr>
+        <p:spPr>
+          <a:xfrm>
+            <a:off x="1071538" y="1643050"/>
+            <a:ext cx="3929090" cy="1077218"/>
+          </a:xfrm>
+          <a:prstGeom prst="rect">
+            <a:avLst/>
+          </a:prstGeom>
+          <a:noFill/>
+        </p:spPr>
+        <p:txBody>
+          <a:bodyPr wrap="square" rtlCol="0">
+            <a:spAutoFit/>
+          </a:bodyPr>
+          <a:lstStyle/>
+          <a:p>
+            <a:r>
+              <a:rPr lang="es-AR" sz="3200" dirty="0"/>
               <a:t>*Para que sirve y para que no</a:t>
             </a:r>
-            <a:endParaRPr lang="es-AR" sz="3200" dirty="0"/>
           </a:p>
         </p:txBody>
       </p:sp>
@@ -5133,10 +5640,9 @@
           <a:lstStyle/>
           <a:p>
             <a:r>
-              <a:rPr lang="es-AR" dirty="0" smtClean="0"/>
+              <a:rPr lang="es-AR" dirty="0"/>
               <a:t>Evolución</a:t>
             </a:r>
-            <a:endParaRPr lang="es-AR" dirty="0"/>
           </a:p>
         </p:txBody>
       </p:sp>
@@ -5163,11 +5669,11 @@
           <a:lstStyle/>
           <a:p>
             <a:r>
-              <a:rPr lang="es-AR" sz="3200" dirty="0" smtClean="0"/>
+              <a:rPr lang="es-AR" sz="3200" dirty="0"/>
               <a:t>1993:   </a:t>
             </a:r>
             <a:r>
-              <a:rPr lang="es-AR" sz="2800" dirty="0" smtClean="0"/>
+              <a:rPr lang="es-AR" sz="2800" dirty="0"/>
               <a:t>Nace LUA v1.0</a:t>
             </a:r>
             <a:endParaRPr lang="es-AR" sz="3200" dirty="0"/>
@@ -5197,19 +5703,19 @@
           <a:lstStyle/>
           <a:p>
             <a:r>
-              <a:rPr lang="es-AR" sz="3200" dirty="0" smtClean="0"/>
+              <a:rPr lang="es-AR" sz="3200" dirty="0"/>
               <a:t>1995:   </a:t>
             </a:r>
             <a:r>
-              <a:rPr lang="es-AR" sz="2800" dirty="0" err="1" smtClean="0"/>
+              <a:rPr lang="es-AR" sz="2800" dirty="0" err="1"/>
               <a:t>Lua</a:t>
             </a:r>
             <a:r>
-              <a:rPr lang="es-AR" sz="2800" dirty="0" smtClean="0"/>
+              <a:rPr lang="es-AR" sz="2800" dirty="0"/>
               <a:t> 2.1 - </a:t>
             </a:r>
             <a:r>
-              <a:rPr lang="es-AR" sz="2400" dirty="0" smtClean="0"/>
+              <a:rPr lang="es-AR" sz="2400" dirty="0"/>
               <a:t>Semántica extensible con retrocesos y POO.</a:t>
             </a:r>
             <a:endParaRPr lang="es-AR" sz="3200" dirty="0"/>
@@ -5239,24 +5745,20 @@
           <a:lstStyle/>
           <a:p>
             <a:r>
-              <a:rPr lang="es-AR" sz="3200" dirty="0" smtClean="0"/>
+              <a:rPr lang="es-AR" sz="3200" dirty="0"/>
               <a:t>1997:   </a:t>
             </a:r>
             <a:r>
-              <a:rPr lang="es-AR" sz="2800" dirty="0" err="1" smtClean="0"/>
+              <a:rPr lang="es-AR" sz="2800" dirty="0" err="1"/>
               <a:t>Lua</a:t>
             </a:r>
             <a:r>
-              <a:rPr lang="es-AR" sz="2800" dirty="0" smtClean="0"/>
+              <a:rPr lang="es-AR" sz="2800" dirty="0"/>
               <a:t> 3.0 </a:t>
             </a:r>
             <a:r>
               <a:rPr lang="es-AR" sz="2400" dirty="0"/>
-              <a:t>-</a:t>
-            </a:r>
-            <a:r>
-              <a:rPr lang="es-AR" sz="2400" dirty="0" smtClean="0"/>
-              <a:t> Métodos de etiquetas (TAG METODS). </a:t>
+              <a:t>- Métodos de etiquetas (TAG METODS). </a:t>
             </a:r>
             <a:endParaRPr lang="es-AR" sz="2800" dirty="0"/>
           </a:p>
@@ -5285,27 +5787,27 @@
           <a:lstStyle/>
           <a:p>
             <a:r>
-              <a:rPr lang="es-AR" sz="3200" dirty="0" smtClean="0"/>
+              <a:rPr lang="es-AR" sz="3200" dirty="0"/>
               <a:t>2000:   </a:t>
             </a:r>
             <a:r>
-              <a:rPr lang="es-AR" sz="2800" dirty="0" err="1" smtClean="0"/>
+              <a:rPr lang="es-AR" sz="2800" dirty="0" err="1"/>
               <a:t>Lua</a:t>
             </a:r>
             <a:r>
-              <a:rPr lang="es-AR" sz="2800" dirty="0" smtClean="0"/>
+              <a:rPr lang="es-AR" sz="2800" dirty="0"/>
               <a:t> 4.0 - </a:t>
             </a:r>
             <a:r>
-              <a:rPr lang="es-AR" sz="2400" dirty="0" smtClean="0"/>
+              <a:rPr lang="es-AR" sz="2400" dirty="0"/>
               <a:t>Declaraciones múltiples, interfaz para crear un 			          </a:t>
             </a:r>
             <a:r>
-              <a:rPr lang="es-AR" sz="2400" dirty="0" err="1" smtClean="0"/>
+              <a:rPr lang="es-AR" sz="2400" dirty="0" err="1"/>
               <a:t>debugger</a:t>
             </a:r>
             <a:r>
-              <a:rPr lang="es-AR" sz="2400" dirty="0" smtClean="0"/>
+              <a:rPr lang="es-AR" sz="2400" dirty="0"/>
               <a:t>. </a:t>
             </a:r>
             <a:endParaRPr lang="es-AR" sz="3200" dirty="0"/>
@@ -5335,108 +5837,96 @@
           <a:lstStyle/>
           <a:p>
             <a:r>
-              <a:rPr lang="es-AR" sz="3200" dirty="0" smtClean="0"/>
+              <a:rPr lang="es-AR" sz="3200" dirty="0"/>
               <a:t>2003:   </a:t>
             </a:r>
             <a:r>
-              <a:rPr lang="es-AR" sz="2800" dirty="0" err="1" smtClean="0"/>
+              <a:rPr lang="es-AR" sz="2800" dirty="0" err="1"/>
               <a:t>Lua</a:t>
             </a:r>
             <a:r>
-              <a:rPr lang="es-AR" sz="2800" dirty="0" smtClean="0"/>
+              <a:rPr lang="es-AR" sz="2800" dirty="0"/>
               <a:t> 5.0 – </a:t>
             </a:r>
             <a:r>
-              <a:rPr lang="es-AR" sz="2400" dirty="0" smtClean="0"/>
+              <a:rPr lang="es-AR" sz="2400" dirty="0"/>
               <a:t>Soporte </a:t>
             </a:r>
             <a:r>
-              <a:rPr lang="es-AR" sz="2400" dirty="0" err="1" smtClean="0"/>
+              <a:rPr lang="es-AR" sz="2400" dirty="0" err="1"/>
               <a:t>Multithreading</a:t>
             </a:r>
             <a:r>
-              <a:rPr lang="es-AR" sz="2400" dirty="0" smtClean="0"/>
+              <a:rPr lang="es-AR" sz="2400" dirty="0"/>
               <a:t> , </a:t>
             </a:r>
             <a:r>
-              <a:rPr lang="es-AR" sz="2400" dirty="0" err="1" smtClean="0"/>
+              <a:rPr lang="es-AR" sz="2400" dirty="0" err="1"/>
               <a:t>scoping</a:t>
             </a:r>
             <a:r>
-              <a:rPr lang="es-AR" sz="2400" dirty="0" smtClean="0"/>
+              <a:rPr lang="es-AR" sz="2400" dirty="0"/>
               <a:t> y 	 	      		           </a:t>
             </a:r>
             <a:r>
-              <a:rPr lang="es-AR" sz="2400" dirty="0" err="1" smtClean="0"/>
+              <a:rPr lang="es-AR" sz="2400" dirty="0" err="1"/>
               <a:t>metatables</a:t>
             </a:r>
             <a:r>
-              <a:rPr lang="es-AR" sz="2400" dirty="0" smtClean="0"/>
-              <a:t> en vez </a:t>
-            </a:r>
-            <a:r>
-              <a:rPr lang="es-AR" sz="2400" dirty="0" err="1" smtClean="0"/>
-              <a:t>tag</a:t>
-            </a:r>
-            <a:r>
-              <a:rPr lang="es-AR" sz="2400" dirty="0" smtClean="0"/>
+              <a:rPr lang="es-AR" sz="2400" dirty="0"/>
+              <a:t> en vez tag </a:t>
+            </a:r>
+            <a:r>
+              <a:rPr lang="es-AR" sz="2400" dirty="0" err="1"/>
+              <a:t>methods</a:t>
+            </a:r>
+            <a:r>
+              <a:rPr lang="es-AR" sz="2400" dirty="0"/>
+              <a:t>.</a:t>
+            </a:r>
+          </a:p>
+          <a:p>
+            <a:r>
+              <a:rPr lang="es-AR" sz="2400" dirty="0"/>
+              <a:t>                                      Introducción de </a:t>
+            </a:r>
+            <a:r>
+              <a:rPr lang="es-AR" sz="2400" dirty="0" err="1"/>
+              <a:t>booleans</a:t>
+            </a:r>
+            <a:r>
+              <a:rPr lang="es-AR" sz="2800" dirty="0"/>
+              <a:t>, </a:t>
+            </a:r>
+            <a:r>
+              <a:rPr lang="es-AR" sz="2800" dirty="0" err="1"/>
+              <a:t>proper</a:t>
+            </a:r>
+            <a:r>
+              <a:rPr lang="es-AR" sz="2800" dirty="0"/>
               <a:t> </a:t>
             </a:r>
             <a:r>
-              <a:rPr lang="es-AR" sz="2400" dirty="0" err="1" smtClean="0"/>
-              <a:t>methords</a:t>
-            </a:r>
-            <a:r>
-              <a:rPr lang="es-AR" sz="2400" dirty="0" smtClean="0"/>
+              <a:rPr lang="es-AR" sz="2800" dirty="0" err="1"/>
+              <a:t>tail</a:t>
+            </a:r>
+            <a:r>
+              <a:rPr lang="es-AR" sz="2800" dirty="0"/>
+              <a:t> </a:t>
+            </a:r>
+            <a:r>
+              <a:rPr lang="es-AR" sz="2800" dirty="0" err="1"/>
+              <a:t>calls</a:t>
+            </a:r>
+            <a:r>
+              <a:rPr lang="es-AR" sz="2800" dirty="0"/>
               <a:t>.</a:t>
             </a:r>
           </a:p>
           <a:p>
             <a:r>
-              <a:rPr lang="es-AR" sz="2400" dirty="0" smtClean="0"/>
-              <a:t>                                      Introducción de </a:t>
-            </a:r>
-            <a:r>
-              <a:rPr lang="es-AR" sz="2400" dirty="0" err="1" smtClean="0"/>
-              <a:t>booleans</a:t>
-            </a:r>
-            <a:r>
-              <a:rPr lang="es-AR" sz="2800" dirty="0" smtClean="0"/>
-              <a:t>, </a:t>
-            </a:r>
-            <a:r>
-              <a:rPr lang="es-AR" sz="2800" dirty="0" err="1" smtClean="0"/>
-              <a:t>proper</a:t>
-            </a:r>
-            <a:r>
-              <a:rPr lang="es-AR" sz="2800" dirty="0" smtClean="0"/>
-              <a:t> </a:t>
-            </a:r>
-            <a:r>
-              <a:rPr lang="es-AR" sz="2800" dirty="0" err="1" smtClean="0"/>
-              <a:t>tail</a:t>
-            </a:r>
-            <a:r>
-              <a:rPr lang="es-AR" sz="2800" dirty="0" smtClean="0"/>
-              <a:t> </a:t>
-            </a:r>
-            <a:r>
-              <a:rPr lang="es-AR" sz="2800" dirty="0" err="1" smtClean="0"/>
-              <a:t>calls</a:t>
-            </a:r>
-            <a:r>
-              <a:rPr lang="es-AR" sz="2800" dirty="0" smtClean="0"/>
-              <a:t>.</a:t>
-            </a:r>
-          </a:p>
-          <a:p>
-            <a:r>
               <a:rPr lang="es-AR" sz="2800" dirty="0"/>
-              <a:t>	</a:t>
-            </a:r>
-            <a:r>
-              <a:rPr lang="es-AR" sz="2800" dirty="0" smtClean="0"/>
-              <a:t>	              </a:t>
+              <a:t>		              </a:t>
             </a:r>
             <a:endParaRPr lang="es-AR" sz="3200" dirty="0"/>
           </a:p>
@@ -5473,13 +5963,6 @@
   <p:clrMapOvr>
     <a:masterClrMapping/>
   </p:clrMapOvr>
-  <p:timing>
-    <p:tnLst>
-      <p:par>
-        <p:cTn id="1" dur="indefinite" restart="never" nodeType="tmRoot"/>
-      </p:par>
-    </p:tnLst>
-  </p:timing>
 </p:sld>
 </file>
 
@@ -5516,10 +5999,9 @@
           <a:lstStyle/>
           <a:p>
             <a:r>
-              <a:rPr lang="es-AR" dirty="0" smtClean="0"/>
+              <a:rPr lang="es-AR" dirty="0"/>
               <a:t>Evolución</a:t>
             </a:r>
-            <a:endParaRPr lang="es-AR" dirty="0"/>
           </a:p>
         </p:txBody>
       </p:sp>
@@ -5546,19 +6028,19 @@
           <a:lstStyle/>
           <a:p>
             <a:r>
-              <a:rPr lang="es-AR" sz="3200" dirty="0" smtClean="0"/>
+              <a:rPr lang="es-AR" sz="3200" dirty="0"/>
               <a:t>2015:   </a:t>
             </a:r>
             <a:r>
-              <a:rPr lang="es-AR" sz="2800" dirty="0" err="1" smtClean="0"/>
+              <a:rPr lang="es-AR" sz="2800" dirty="0" err="1"/>
               <a:t>Lua</a:t>
             </a:r>
             <a:r>
-              <a:rPr lang="es-AR" sz="2800" dirty="0" smtClean="0"/>
+              <a:rPr lang="es-AR" sz="2800" dirty="0"/>
               <a:t> 5.3 – </a:t>
             </a:r>
             <a:r>
-              <a:rPr lang="es-AR" sz="2400" dirty="0" smtClean="0"/>
+              <a:rPr lang="es-AR" sz="2400" dirty="0"/>
               <a:t>Introducción de Enteros, Operaciones de 		                         Bits, Librería UTF-8 y soporte 32 y 64 bits.  </a:t>
             </a:r>
             <a:endParaRPr lang="es-AR" sz="3200" dirty="0"/>
@@ -5588,34 +6070,33 @@
           <a:lstStyle/>
           <a:p>
             <a:r>
-              <a:rPr lang="es-AR" sz="3200" dirty="0" err="1" smtClean="0"/>
+              <a:rPr lang="es-AR" sz="3200" dirty="0" err="1"/>
               <a:t>Work</a:t>
             </a:r>
             <a:r>
-              <a:rPr lang="es-AR" sz="3200" dirty="0" smtClean="0"/>
+              <a:rPr lang="es-AR" sz="3200" dirty="0"/>
               <a:t> in </a:t>
             </a:r>
             <a:r>
-              <a:rPr lang="es-AR" sz="3200" dirty="0" err="1" smtClean="0"/>
+              <a:rPr lang="es-AR" sz="3200" dirty="0" err="1"/>
               <a:t>Progress</a:t>
             </a:r>
             <a:r>
-              <a:rPr lang="es-AR" sz="3200" dirty="0" smtClean="0"/>
+              <a:rPr lang="es-AR" sz="3200" dirty="0"/>
               <a:t>:</a:t>
             </a:r>
             <a:r>
-              <a:rPr lang="es-AR" sz="2800" dirty="0" smtClean="0"/>
+              <a:rPr lang="es-AR" sz="2800" dirty="0"/>
               <a:t> </a:t>
             </a:r>
             <a:r>
-              <a:rPr lang="es-AR" sz="2800" dirty="0" err="1" smtClean="0"/>
+              <a:rPr lang="es-AR" sz="2800" dirty="0" err="1"/>
               <a:t>Lua</a:t>
             </a:r>
             <a:r>
-              <a:rPr lang="es-AR" sz="2800" dirty="0" smtClean="0"/>
+              <a:rPr lang="es-AR" sz="2800" dirty="0"/>
               <a:t> 5.4</a:t>
             </a:r>
-            <a:endParaRPr lang="es-AR" sz="2800" dirty="0"/>
           </a:p>
         </p:txBody>
       </p:sp>
@@ -5650,13 +6131,6 @@
   <p:clrMapOvr>
     <a:masterClrMapping/>
   </p:clrMapOvr>
-  <p:timing>
-    <p:tnLst>
-      <p:par>
-        <p:cTn id="1" dur="indefinite" restart="never" nodeType="tmRoot"/>
-      </p:par>
-    </p:tnLst>
-  </p:timing>
 </p:sld>
 </file>
 
@@ -5698,10 +6172,9 @@
           <a:lstStyle/>
           <a:p>
             <a:r>
-              <a:rPr lang="es-AR" dirty="0" smtClean="0"/>
+              <a:rPr lang="es-AR" dirty="0"/>
               <a:t>Lenguaje</a:t>
             </a:r>
-            <a:endParaRPr lang="es-AR" dirty="0"/>
           </a:p>
         </p:txBody>
       </p:sp>
@@ -5728,10 +6201,9 @@
           <a:lstStyle/>
           <a:p>
             <a:r>
-              <a:rPr lang="es-AR" sz="2400" u="sng" dirty="0" smtClean="0"/>
+              <a:rPr lang="es-AR" sz="2400" u="sng" dirty="0"/>
               <a:t>Características básicas </a:t>
             </a:r>
-            <a:endParaRPr lang="es-AR" sz="2400" u="sng" dirty="0"/>
           </a:p>
         </p:txBody>
       </p:sp>
@@ -5762,7 +6234,7 @@
               <a:buChar char="•"/>
             </a:pPr>
             <a:r>
-              <a:rPr lang="es-AR" dirty="0" smtClean="0"/>
+              <a:rPr lang="es-AR" dirty="0"/>
               <a:t> Lenguaje Interpretado</a:t>
             </a:r>
           </a:p>
@@ -5772,7 +6244,7 @@
               <a:buChar char="•"/>
             </a:pPr>
             <a:r>
-              <a:rPr lang="es-AR" dirty="0" smtClean="0"/>
+              <a:rPr lang="es-AR" dirty="0"/>
               <a:t> TIPADO</a:t>
             </a:r>
           </a:p>
@@ -5906,10 +6378,9 @@
           <a:lstStyle/>
           <a:p>
             <a:r>
-              <a:rPr lang="es-AR" dirty="0" smtClean="0"/>
+              <a:rPr lang="es-AR" dirty="0"/>
               <a:t>POO</a:t>
             </a:r>
-            <a:endParaRPr lang="es-AR" dirty="0"/>
           </a:p>
         </p:txBody>
       </p:sp>
@@ -5936,10 +6407,9 @@
           <a:lstStyle/>
           <a:p>
             <a:r>
-              <a:rPr lang="es-AR" dirty="0" smtClean="0"/>
+              <a:rPr lang="es-AR" dirty="0"/>
               <a:t>Concurrente</a:t>
             </a:r>
-            <a:endParaRPr lang="es-AR" dirty="0"/>
           </a:p>
         </p:txBody>
       </p:sp>
@@ -6001,10 +6471,9 @@
           <a:lstStyle/>
           <a:p>
             <a:r>
-              <a:rPr lang="es-AR" dirty="0" smtClean="0"/>
+              <a:rPr lang="es-AR" dirty="0"/>
               <a:t>GOAL</a:t>
             </a:r>
-            <a:endParaRPr lang="es-AR" dirty="0"/>
           </a:p>
         </p:txBody>
       </p:sp>
@@ -6031,10 +6500,9 @@
           <a:lstStyle/>
           <a:p>
             <a:r>
-              <a:rPr lang="es-AR" dirty="0" smtClean="0"/>
+              <a:rPr lang="es-AR" dirty="0"/>
               <a:t>Concurrente</a:t>
             </a:r>
-            <a:endParaRPr lang="es-AR" dirty="0"/>
           </a:p>
         </p:txBody>
       </p:sp>
@@ -6096,10 +6564,9 @@
           <a:lstStyle/>
           <a:p>
             <a:r>
-              <a:rPr lang="es-AR" dirty="0" smtClean="0"/>
+              <a:rPr lang="es-AR" dirty="0"/>
               <a:t>Descripción de Datos</a:t>
             </a:r>
-            <a:endParaRPr lang="es-AR" dirty="0"/>
           </a:p>
         </p:txBody>
       </p:sp>
@@ -6130,13 +6597,13 @@
               <a:buChar char="•"/>
             </a:pPr>
             <a:r>
-              <a:rPr lang="es-AR" dirty="0" smtClean="0"/>
+              <a:rPr lang="es-AR" dirty="0"/>
               <a:t>PARADIGMAS:</a:t>
             </a:r>
             <a:br>
-              <a:rPr lang="es-AR" dirty="0" smtClean="0"/>
+              <a:rPr lang="es-AR" dirty="0"/>
             </a:br>
-            <a:endParaRPr lang="es-AR" dirty="0" smtClean="0"/>
+            <a:endParaRPr lang="es-AR" dirty="0"/>
           </a:p>
           <a:p>
             <a:pPr lvl="1">
@@ -6144,21 +6611,17 @@
               <a:buChar char="§"/>
             </a:pPr>
             <a:r>
-              <a:rPr lang="es-AR" dirty="0" smtClean="0"/>
+              <a:rPr lang="es-AR" dirty="0"/>
               <a:t> Lenguaje </a:t>
             </a:r>
             <a:r>
-              <a:rPr lang="es-AR" dirty="0" err="1" smtClean="0"/>
+              <a:rPr lang="es-AR" dirty="0" err="1"/>
               <a:t>Procedural</a:t>
             </a:r>
-            <a:r>
-              <a:rPr lang="es-AR" dirty="0" smtClean="0"/>
-              <a:t/>
-            </a:r>
             <a:br>
-              <a:rPr lang="es-AR" dirty="0" smtClean="0"/>
+              <a:rPr lang="es-AR" dirty="0"/>
             </a:br>
-            <a:endParaRPr lang="es-AR" dirty="0" smtClean="0"/>
+            <a:endParaRPr lang="es-AR" dirty="0"/>
           </a:p>
           <a:p>
             <a:pPr lvl="1">
@@ -6166,10 +6629,9 @@
               <a:buChar char="§"/>
             </a:pPr>
             <a:r>
-              <a:rPr lang="es-AR" dirty="0" smtClean="0"/>
+              <a:rPr lang="es-AR" dirty="0"/>
               <a:t> MULTIPARADIGMATICO</a:t>
             </a:r>
-            <a:endParaRPr lang="es-AR" dirty="0"/>
           </a:p>
         </p:txBody>
       </p:sp>
@@ -6200,18 +6662,18 @@
               <a:buChar char="§"/>
             </a:pPr>
             <a:r>
-              <a:rPr lang="es-AR" dirty="0" err="1" smtClean="0"/>
+              <a:rPr lang="es-AR" dirty="0" err="1"/>
               <a:t>Duck</a:t>
             </a:r>
             <a:r>
-              <a:rPr lang="es-AR" dirty="0" smtClean="0"/>
+              <a:rPr lang="es-AR" dirty="0"/>
               <a:t> </a:t>
             </a:r>
             <a:r>
-              <a:rPr lang="es-AR" dirty="0" err="1" smtClean="0"/>
+              <a:rPr lang="es-AR" dirty="0" err="1"/>
               <a:t>Typing</a:t>
             </a:r>
-            <a:endParaRPr lang="es-AR" dirty="0" smtClean="0"/>
+            <a:endParaRPr lang="es-AR" dirty="0"/>
           </a:p>
           <a:p>
             <a:pPr>
@@ -6219,14 +6681,14 @@
               <a:buChar char="§"/>
             </a:pPr>
             <a:r>
-              <a:rPr lang="es-AR" dirty="0" smtClean="0"/>
+              <a:rPr lang="es-AR" dirty="0"/>
               <a:t>Fuertemente </a:t>
             </a:r>
             <a:r>
-              <a:rPr lang="es-AR" dirty="0" err="1" smtClean="0"/>
+              <a:rPr lang="es-AR" dirty="0" err="1"/>
               <a:t>tipado</a:t>
             </a:r>
-            <a:endParaRPr lang="es-AR" dirty="0" smtClean="0"/>
+            <a:endParaRPr lang="es-AR" dirty="0"/>
           </a:p>
           <a:p>
             <a:pPr>
@@ -6234,14 +6696,13 @@
               <a:buChar char="§"/>
             </a:pPr>
             <a:r>
-              <a:rPr lang="es-AR" dirty="0" err="1" smtClean="0"/>
+              <a:rPr lang="es-AR" dirty="0" err="1"/>
               <a:t>Tipado</a:t>
             </a:r>
             <a:r>
-              <a:rPr lang="es-AR" dirty="0" smtClean="0"/>
+              <a:rPr lang="es-AR" dirty="0"/>
               <a:t> Dinámico</a:t>
             </a:r>
-            <a:endParaRPr lang="es-AR" dirty="0"/>
           </a:p>
         </p:txBody>
       </p:sp>
@@ -6250,13 +6711,6 @@
   <p:clrMapOvr>
     <a:masterClrMapping/>
   </p:clrMapOvr>
-  <p:timing>
-    <p:tnLst>
-      <p:par>
-        <p:cTn id="1" dur="indefinite" restart="never" nodeType="tmRoot"/>
-      </p:par>
-    </p:tnLst>
-  </p:timing>
 </p:sld>
 </file>
 
@@ -6298,10 +6752,9 @@
           <a:lstStyle/>
           <a:p>
             <a:r>
-              <a:rPr lang="es-AR" dirty="0" smtClean="0"/>
+              <a:rPr lang="es-AR" dirty="0"/>
               <a:t>Conceptos Básicos</a:t>
             </a:r>
-            <a:endParaRPr lang="es-AR" dirty="0"/>
           </a:p>
         </p:txBody>
       </p:sp>
@@ -6328,10 +6781,9 @@
           <a:lstStyle/>
           <a:p>
             <a:r>
-              <a:rPr lang="es-AR" dirty="0" smtClean="0"/>
+              <a:rPr lang="es-AR" dirty="0"/>
               <a:t> </a:t>
             </a:r>
-            <a:endParaRPr lang="es-AR" dirty="0"/>
           </a:p>
         </p:txBody>
       </p:sp>
@@ -6358,10 +6810,9 @@
           <a:lstStyle/>
           <a:p>
             <a:r>
-              <a:rPr lang="es-AR" sz="2400" dirty="0" smtClean="0"/>
+              <a:rPr lang="es-AR" sz="2400" u="sng" dirty="0"/>
               <a:t>TABLAS</a:t>
             </a:r>
-            <a:endParaRPr lang="es-AR" sz="2400" dirty="0"/>
           </a:p>
         </p:txBody>
       </p:sp>
@@ -6374,7 +6825,7 @@
         <p:spPr>
           <a:xfrm>
             <a:off x="642910" y="1500174"/>
-            <a:ext cx="8142037" cy="1477328"/>
+            <a:ext cx="7612597" cy="1477328"/>
           </a:xfrm>
           <a:prstGeom prst="rect">
             <a:avLst/>
@@ -6388,38 +6839,22 @@
           <a:lstStyle/>
           <a:p>
             <a:r>
-              <a:rPr lang="es-AR" dirty="0" smtClean="0"/>
+              <a:rPr lang="es-AR" dirty="0"/>
               <a:t>Las tablas en </a:t>
             </a:r>
             <a:r>
-              <a:rPr lang="es-AR" dirty="0" err="1" smtClean="0"/>
+              <a:rPr lang="es-AR" dirty="0" err="1"/>
               <a:t>Lua</a:t>
             </a:r>
             <a:r>
-              <a:rPr lang="es-AR" dirty="0" smtClean="0"/>
-              <a:t> no son ni valores ni variables, son Objetos. Parecidos a los </a:t>
-            </a:r>
-            <a:r>
-              <a:rPr lang="es-AR" dirty="0" err="1" smtClean="0"/>
-              <a:t>arrays</a:t>
-            </a:r>
-            <a:r>
-              <a:rPr lang="es-AR" dirty="0" smtClean="0"/>
-              <a:t> en</a:t>
-            </a:r>
-          </a:p>
-          <a:p>
-            <a:r>
-              <a:rPr lang="es-AR" dirty="0" smtClean="0"/>
-              <a:t>Java o </a:t>
-            </a:r>
-            <a:r>
-              <a:rPr lang="es-AR" dirty="0" err="1" smtClean="0"/>
-              <a:t>Scheme</a:t>
-            </a:r>
-            <a:r>
-              <a:rPr lang="es-AR" dirty="0" smtClean="0"/>
-              <a:t>.</a:t>
+              <a:rPr lang="es-AR" dirty="0"/>
+              <a:t> no son ni valores ni variables, son Objetos. Es el único tipo de </a:t>
+            </a:r>
+          </a:p>
+          <a:p>
+            <a:r>
+              <a:rPr lang="es-AR" dirty="0"/>
+              <a:t>estructura de datos</a:t>
             </a:r>
           </a:p>
           <a:p>
@@ -6427,24 +6862,15 @@
           </a:p>
           <a:p>
             <a:r>
-              <a:rPr lang="es-AR" dirty="0" smtClean="0"/>
-              <a:t>Se puede ver a la Tabla como un Objeto Dinámico manejado por punteros. </a:t>
-            </a:r>
-          </a:p>
-          <a:p>
-            <a:r>
-              <a:rPr lang="es-AR" dirty="0" smtClean="0"/>
-              <a:t>La tabla acepta no solo números, también cualquier otro valor excepto el </a:t>
-            </a:r>
-            <a:r>
-              <a:rPr lang="es-AR" dirty="0" err="1" smtClean="0"/>
-              <a:t>Nil</a:t>
-            </a:r>
-            <a:r>
-              <a:rPr lang="es-AR" dirty="0" smtClean="0"/>
-              <a:t>.</a:t>
-            </a:r>
-            <a:endParaRPr lang="es-AR" dirty="0"/>
+              <a:rPr lang="es-AR" dirty="0"/>
+              <a:t>Se puede ver a la Tabla como un Objeto Dinámico manejado por punteros.</a:t>
+            </a:r>
+          </a:p>
+          <a:p>
+            <a:r>
+              <a:rPr lang="es-AR" dirty="0"/>
+              <a:t>La tabla acepta no solo números, también cualquier otro valor excepto el Nil.</a:t>
+            </a:r>
           </a:p>
         </p:txBody>
       </p:sp>
@@ -6486,13 +6912,6 @@
   <p:clrMapOvr>
     <a:masterClrMapping/>
   </p:clrMapOvr>
-  <p:timing>
-    <p:tnLst>
-      <p:par>
-        <p:cTn id="1" dur="indefinite" restart="never" nodeType="tmRoot"/>
-      </p:par>
-    </p:tnLst>
-  </p:timing>
 </p:sld>
 </file>
 
@@ -6515,14 +6934,20 @@
       </p:grpSpPr>
       <p:sp>
         <p:nvSpPr>
-          <p:cNvPr id="3" name="2 CuadroTexto"/>
+          <p:cNvPr id="4" name="3 CuadroTexto">
+            <a:extLst>
+              <a:ext uri="{FF2B5EF4-FFF2-40B4-BE49-F238E27FC236}">
+                <a16:creationId xmlns:a16="http://schemas.microsoft.com/office/drawing/2014/main" id="{EBF77536-9418-47C9-B3BE-1F5C45C856D1}"/>
+              </a:ext>
+            </a:extLst>
+          </p:cNvPr>
           <p:cNvSpPr txBox="1"/>
           <p:nvPr/>
         </p:nvSpPr>
         <p:spPr>
           <a:xfrm>
-            <a:off x="1857356" y="2500306"/>
-            <a:ext cx="3162404" cy="369332"/>
+            <a:off x="571472" y="928670"/>
+            <a:ext cx="1500198" cy="461665"/>
           </a:xfrm>
           <a:prstGeom prst="rect">
             <a:avLst/>
@@ -6530,16 +6955,123 @@
           <a:noFill/>
         </p:spPr>
         <p:txBody>
-          <a:bodyPr wrap="none" rtlCol="0">
+          <a:bodyPr wrap="square" rtlCol="0">
             <a:spAutoFit/>
           </a:bodyPr>
           <a:lstStyle/>
           <a:p>
             <a:r>
-              <a:rPr lang="es-AR" dirty="0" smtClean="0"/>
-              <a:t>BUSCAR + EJEMPLOS DE TABLAS</a:t>
-            </a:r>
-            <a:endParaRPr lang="es-AR" dirty="0"/>
+              <a:rPr lang="es-AR" sz="2400" u="sng" dirty="0"/>
+              <a:t>TABLAS</a:t>
+            </a:r>
+          </a:p>
+        </p:txBody>
+      </p:sp>
+      <p:pic>
+        <p:nvPicPr>
+          <p:cNvPr id="2" name="Imagen 1">
+            <a:extLst>
+              <a:ext uri="{FF2B5EF4-FFF2-40B4-BE49-F238E27FC236}">
+                <a16:creationId xmlns:a16="http://schemas.microsoft.com/office/drawing/2014/main" id="{EABE4D5D-8C96-4E45-9CAD-26FFC7587507}"/>
+              </a:ext>
+            </a:extLst>
+          </p:cNvPr>
+          <p:cNvPicPr>
+            <a:picLocks noChangeAspect="1"/>
+          </p:cNvPicPr>
+          <p:nvPr/>
+        </p:nvPicPr>
+        <p:blipFill>
+          <a:blip r:embed="rId2"/>
+          <a:stretch>
+            <a:fillRect/>
+          </a:stretch>
+        </p:blipFill>
+        <p:spPr>
+          <a:xfrm>
+            <a:off x="571472" y="1988840"/>
+            <a:ext cx="4740527" cy="1080120"/>
+          </a:xfrm>
+          <a:prstGeom prst="rect">
+            <a:avLst/>
+          </a:prstGeom>
+        </p:spPr>
+      </p:pic>
+      <p:sp>
+        <p:nvSpPr>
+          <p:cNvPr id="5" name="CuadroTexto 4">
+            <a:extLst>
+              <a:ext uri="{FF2B5EF4-FFF2-40B4-BE49-F238E27FC236}">
+                <a16:creationId xmlns:a16="http://schemas.microsoft.com/office/drawing/2014/main" id="{271B8C3F-0237-4CDA-A00D-5A77279E205D}"/>
+              </a:ext>
+            </a:extLst>
+          </p:cNvPr>
+          <p:cNvSpPr txBox="1"/>
+          <p:nvPr/>
+        </p:nvSpPr>
+        <p:spPr>
+          <a:xfrm>
+            <a:off x="583598" y="1504921"/>
+            <a:ext cx="6436674" cy="369332"/>
+          </a:xfrm>
+          <a:prstGeom prst="rect">
+            <a:avLst/>
+          </a:prstGeom>
+          <a:noFill/>
+        </p:spPr>
+        <p:txBody>
+          <a:bodyPr wrap="square" rtlCol="0">
+            <a:spAutoFit/>
+          </a:bodyPr>
+          <a:lstStyle/>
+          <a:p>
+            <a:r>
+              <a:rPr lang="es-ES" dirty="0"/>
+              <a:t>Esta manera de inicializar la tabla son equivalentes</a:t>
+            </a:r>
+          </a:p>
+        </p:txBody>
+      </p:sp>
+      <p:sp>
+        <p:nvSpPr>
+          <p:cNvPr id="6" name="CuadroTexto 5">
+            <a:extLst>
+              <a:ext uri="{FF2B5EF4-FFF2-40B4-BE49-F238E27FC236}">
+                <a16:creationId xmlns:a16="http://schemas.microsoft.com/office/drawing/2014/main" id="{6E23F378-91BC-4246-A332-8FEEA0F6E7E7}"/>
+              </a:ext>
+            </a:extLst>
+          </p:cNvPr>
+          <p:cNvSpPr txBox="1"/>
+          <p:nvPr/>
+        </p:nvSpPr>
+        <p:spPr>
+          <a:xfrm>
+            <a:off x="971600" y="4437112"/>
+            <a:ext cx="6846881" cy="1200329"/>
+          </a:xfrm>
+          <a:prstGeom prst="rect">
+            <a:avLst/>
+          </a:prstGeom>
+          <a:noFill/>
+        </p:spPr>
+        <p:txBody>
+          <a:bodyPr wrap="square" rtlCol="0">
+            <a:spAutoFit/>
+          </a:bodyPr>
+          <a:lstStyle/>
+          <a:p>
+            <a:pPr algn="ctr"/>
+            <a:r>
+              <a:rPr lang="es-ES" sz="2400" dirty="0"/>
+              <a:t>LA TABLA ES LA UNICA ESTRUCTURA DE DATOS, Y CON ELLA PODES</a:t>
+            </a:r>
+            <a:br>
+              <a:rPr lang="es-ES" sz="2400" dirty="0"/>
+            </a:br>
+            <a:r>
+              <a:rPr lang="es-ES" sz="2400" dirty="0"/>
+              <a:t>HACER LO QUE SEA</a:t>
+            </a:r>
           </a:p>
         </p:txBody>
       </p:sp>
@@ -6591,10 +7123,9 @@
           <a:lstStyle/>
           <a:p>
             <a:r>
-              <a:rPr lang="es-AR" sz="2400" dirty="0" smtClean="0"/>
+              <a:rPr lang="es-AR" sz="2400" u="sng" dirty="0"/>
               <a:t>FUNCIONES</a:t>
             </a:r>
-            <a:endParaRPr lang="es-AR" sz="2400" dirty="0"/>
           </a:p>
         </p:txBody>
       </p:sp>
@@ -6621,37 +7152,37 @@
           <a:lstStyle/>
           <a:p>
             <a:r>
-              <a:rPr lang="es-AR" dirty="0" smtClean="0"/>
+              <a:rPr lang="es-AR" dirty="0"/>
               <a:t>Las Funciones sirven para llamar a un </a:t>
             </a:r>
             <a:r>
-              <a:rPr lang="es-AR" dirty="0" err="1" smtClean="0"/>
+              <a:rPr lang="es-AR" dirty="0" err="1"/>
               <a:t>statment</a:t>
             </a:r>
             <a:r>
-              <a:rPr lang="es-AR" dirty="0" smtClean="0"/>
+              <a:rPr lang="es-AR" dirty="0"/>
               <a:t> (</a:t>
             </a:r>
             <a:r>
-              <a:rPr lang="es-AR" dirty="0" err="1" smtClean="0"/>
+              <a:rPr lang="es-AR" dirty="0" err="1"/>
               <a:t>procedure</a:t>
             </a:r>
             <a:r>
-              <a:rPr lang="es-AR" dirty="0" smtClean="0"/>
+              <a:rPr lang="es-AR" dirty="0"/>
               <a:t> o </a:t>
             </a:r>
             <a:r>
-              <a:rPr lang="es-AR" dirty="0" err="1" smtClean="0"/>
+              <a:rPr lang="es-AR" dirty="0" err="1"/>
               <a:t>subroutine</a:t>
             </a:r>
             <a:r>
-              <a:rPr lang="es-AR" dirty="0" smtClean="0"/>
+              <a:rPr lang="es-AR" dirty="0"/>
               <a:t>) o usarla</a:t>
             </a:r>
           </a:p>
           <a:p>
             <a:r>
-              <a:rPr lang="es-AR" dirty="0" smtClean="0"/>
+              <a:rPr lang="es-AR" dirty="0"/>
               <a:t>como una expresión.</a:t>
             </a:r>
           </a:p>
@@ -6660,34 +7191,29 @@
           </a:p>
           <a:p>
             <a:r>
-              <a:rPr lang="es-AR" dirty="0" smtClean="0"/>
+              <a:rPr lang="es-AR" dirty="0"/>
               <a:t>Para llamarla se requiere de utilizar un paréntesis aun cuando no tiene argumentos,</a:t>
             </a:r>
           </a:p>
           <a:p>
             <a:r>
-              <a:rPr lang="es-AR" dirty="0" smtClean="0"/>
-              <a:t>excepto que tenga un solo argumente y este sea un </a:t>
-            </a:r>
-            <a:r>
-              <a:rPr lang="es-AR" dirty="0" err="1" smtClean="0"/>
+              <a:rPr lang="es-AR" dirty="0"/>
+              <a:t>excepto que tenga un solo argumento y este sea un </a:t>
+            </a:r>
+            <a:r>
+              <a:rPr lang="es-AR" dirty="0" err="1"/>
               <a:t>String</a:t>
             </a:r>
             <a:r>
               <a:rPr lang="es-AR" dirty="0"/>
-              <a:t> </a:t>
-            </a:r>
-            <a:r>
-              <a:rPr lang="es-AR" dirty="0" smtClean="0"/>
-              <a:t>literal o un constructor de</a:t>
-            </a:r>
-          </a:p>
-          <a:p>
-            <a:r>
-              <a:rPr lang="es-AR" dirty="0" smtClean="0"/>
-              <a:t>tabla</a:t>
-            </a:r>
-            <a:endParaRPr lang="es-AR" dirty="0"/>
+              <a:t> literal o un constructor de</a:t>
+            </a:r>
+          </a:p>
+          <a:p>
+            <a:r>
+              <a:rPr lang="es-AR" dirty="0"/>
+              <a:t>tabla.</a:t>
+            </a:r>
           </a:p>
         </p:txBody>
       </p:sp>
@@ -6772,14 +7298,13 @@
           <a:lstStyle/>
           <a:p>
             <a:r>
-              <a:rPr lang="es-AR" sz="2400" dirty="0" err="1" smtClean="0"/>
+              <a:rPr lang="es-AR" sz="2400" dirty="0" err="1"/>
               <a:t>Multiple</a:t>
             </a:r>
             <a:r>
-              <a:rPr lang="es-AR" sz="2400" dirty="0" smtClean="0"/>
+              <a:rPr lang="es-AR" sz="2400" dirty="0"/>
               <a:t> Retorno</a:t>
             </a:r>
-            <a:endParaRPr lang="es-AR" sz="2400" dirty="0"/>
           </a:p>
         </p:txBody>
       </p:sp>
@@ -6839,10 +7364,9 @@
           <a:lstStyle/>
           <a:p>
             <a:r>
-              <a:rPr lang="es-AR" sz="2400" dirty="0" smtClean="0"/>
+              <a:rPr lang="es-AR" sz="2400" dirty="0"/>
               <a:t>Funciones con cantidad variable de argumentos</a:t>
             </a:r>
-            <a:endParaRPr lang="es-AR" sz="2400" dirty="0"/>
           </a:p>
         </p:txBody>
       </p:sp>
@@ -6906,14 +7430,20 @@
       </p:grpSpPr>
       <p:sp>
         <p:nvSpPr>
-          <p:cNvPr id="3" name="2 CuadroTexto"/>
+          <p:cNvPr id="3" name="2 CuadroTexto">
+            <a:extLst>
+              <a:ext uri="{FF2B5EF4-FFF2-40B4-BE49-F238E27FC236}">
+                <a16:creationId xmlns:a16="http://schemas.microsoft.com/office/drawing/2014/main" id="{5D5E9227-73E6-4B63-ACE2-0B77F2DC0220}"/>
+              </a:ext>
+            </a:extLst>
+          </p:cNvPr>
           <p:cNvSpPr txBox="1"/>
           <p:nvPr/>
         </p:nvSpPr>
         <p:spPr>
           <a:xfrm>
-            <a:off x="714348" y="642918"/>
-            <a:ext cx="3714776" cy="461665"/>
+            <a:off x="571472" y="928670"/>
+            <a:ext cx="2143140" cy="461665"/>
           </a:xfrm>
           <a:prstGeom prst="rect">
             <a:avLst/>
@@ -6927,23 +7457,58 @@
           <a:lstStyle/>
           <a:p>
             <a:r>
-              <a:rPr lang="es-AR" sz="2400" dirty="0" smtClean="0"/>
-              <a:t>Características avanzadas </a:t>
-            </a:r>
-            <a:endParaRPr lang="es-AR" sz="2400" dirty="0"/>
-          </a:p>
-        </p:txBody>
-      </p:sp>
-      <p:sp>
-        <p:nvSpPr>
-          <p:cNvPr id="4" name="3 CuadroTexto"/>
+              <a:rPr lang="es-AR" sz="2400" u="sng" dirty="0"/>
+              <a:t>FUNCIONES</a:t>
+            </a:r>
+          </a:p>
+        </p:txBody>
+      </p:sp>
+      <p:pic>
+        <p:nvPicPr>
+          <p:cNvPr id="4" name="Imagen 3">
+            <a:extLst>
+              <a:ext uri="{FF2B5EF4-FFF2-40B4-BE49-F238E27FC236}">
+                <a16:creationId xmlns:a16="http://schemas.microsoft.com/office/drawing/2014/main" id="{8BABB81A-E298-41A5-9451-FAA77A96B59B}"/>
+              </a:ext>
+            </a:extLst>
+          </p:cNvPr>
+          <p:cNvPicPr>
+            <a:picLocks noChangeAspect="1"/>
+          </p:cNvPicPr>
+          <p:nvPr/>
+        </p:nvPicPr>
+        <p:blipFill>
+          <a:blip r:embed="rId2"/>
+          <a:stretch>
+            <a:fillRect/>
+          </a:stretch>
+        </p:blipFill>
+        <p:spPr>
+          <a:xfrm>
+            <a:off x="583047" y="2276872"/>
+            <a:ext cx="5923461" cy="3240360"/>
+          </a:xfrm>
+          <a:prstGeom prst="rect">
+            <a:avLst/>
+          </a:prstGeom>
+        </p:spPr>
+      </p:pic>
+      <p:sp>
+        <p:nvSpPr>
+          <p:cNvPr id="5" name="CuadroTexto 4">
+            <a:extLst>
+              <a:ext uri="{FF2B5EF4-FFF2-40B4-BE49-F238E27FC236}">
+                <a16:creationId xmlns:a16="http://schemas.microsoft.com/office/drawing/2014/main" id="{4DC83E24-C5B6-4AA5-B467-A861E0C7D667}"/>
+              </a:ext>
+            </a:extLst>
+          </p:cNvPr>
           <p:cNvSpPr txBox="1"/>
           <p:nvPr/>
         </p:nvSpPr>
         <p:spPr>
           <a:xfrm>
-            <a:off x="1214414" y="2071678"/>
-            <a:ext cx="2414507" cy="1477328"/>
+            <a:off x="755576" y="1628800"/>
+            <a:ext cx="4437753" cy="369332"/>
           </a:xfrm>
           <a:prstGeom prst="rect">
             <a:avLst/>
@@ -6957,118 +7522,18 @@
           <a:lstStyle/>
           <a:p>
             <a:r>
-              <a:rPr lang="es-AR" dirty="0" err="1" smtClean="0"/>
-              <a:t>Garbage</a:t>
-            </a:r>
-            <a:r>
-              <a:rPr lang="es-AR" dirty="0" smtClean="0"/>
-              <a:t> </a:t>
-            </a:r>
-            <a:r>
-              <a:rPr lang="es-AR" dirty="0" err="1" smtClean="0"/>
-              <a:t>Collector</a:t>
-            </a:r>
-            <a:endParaRPr lang="es-AR" dirty="0" smtClean="0"/>
-          </a:p>
-          <a:p>
-            <a:endParaRPr lang="es-AR" dirty="0"/>
-          </a:p>
-          <a:p>
-            <a:r>
-              <a:rPr lang="es-AR" dirty="0" err="1" smtClean="0"/>
-              <a:t>Closures</a:t>
-            </a:r>
-            <a:endParaRPr lang="es-AR" dirty="0" smtClean="0"/>
-          </a:p>
-          <a:p>
-            <a:endParaRPr lang="es-AR" dirty="0"/>
-          </a:p>
-          <a:p>
-            <a:r>
-              <a:rPr lang="es-AR" dirty="0" smtClean="0"/>
-              <a:t>Funciones de 1era clase</a:t>
-            </a:r>
-            <a:endParaRPr lang="es-AR" dirty="0"/>
-          </a:p>
-        </p:txBody>
-      </p:sp>
-      <p:sp>
-        <p:nvSpPr>
-          <p:cNvPr id="5" name="4 CuadroTexto"/>
-          <p:cNvSpPr txBox="1"/>
-          <p:nvPr/>
-        </p:nvSpPr>
-        <p:spPr>
-          <a:xfrm>
-            <a:off x="1142976" y="3429000"/>
-            <a:ext cx="7500990" cy="2585323"/>
-          </a:xfrm>
-          <a:prstGeom prst="rect">
-            <a:avLst/>
-          </a:prstGeom>
-          <a:noFill/>
-        </p:spPr>
-        <p:txBody>
-          <a:bodyPr wrap="square" rtlCol="0">
-            <a:spAutoFit/>
-          </a:bodyPr>
-          <a:lstStyle/>
-          <a:p>
-            <a:endParaRPr lang="es-AR" dirty="0" smtClean="0"/>
-          </a:p>
-          <a:p>
-            <a:r>
-              <a:rPr lang="es-AR" dirty="0" smtClean="0"/>
-              <a:t>Control de Flujos</a:t>
-            </a:r>
-          </a:p>
-          <a:p>
-            <a:endParaRPr lang="es-AR" dirty="0"/>
-          </a:p>
-          <a:p>
-            <a:r>
-              <a:rPr lang="es-AR" dirty="0" smtClean="0"/>
-              <a:t/>
-            </a:r>
-            <a:br>
-              <a:rPr lang="es-AR" dirty="0" smtClean="0"/>
-            </a:br>
-            <a:r>
-              <a:rPr lang="es-AR" dirty="0" smtClean="0"/>
-              <a:t>Pasaje de </a:t>
-            </a:r>
-            <a:r>
-              <a:rPr lang="es-AR" dirty="0" err="1" smtClean="0"/>
-              <a:t>Parametros</a:t>
-            </a:r>
-            <a:r>
-              <a:rPr lang="es-AR" dirty="0" smtClean="0"/>
-              <a:t>:</a:t>
-            </a:r>
-          </a:p>
-          <a:p>
-            <a:endParaRPr lang="es-AR" dirty="0"/>
-          </a:p>
-          <a:p>
-            <a:r>
-              <a:rPr lang="es-AR" dirty="0" err="1" smtClean="0"/>
-              <a:t>Parametros</a:t>
-            </a:r>
-            <a:r>
-              <a:rPr lang="es-AR" dirty="0" smtClean="0"/>
-              <a:t> como variables locales que se inicializan con lo que vos le pasas</a:t>
-            </a:r>
-            <a:br>
-              <a:rPr lang="es-AR" dirty="0" smtClean="0"/>
-            </a:br>
-            <a:endParaRPr lang="es-AR" dirty="0" smtClean="0"/>
-          </a:p>
-          <a:p>
-            <a:endParaRPr lang="es-AR" dirty="0"/>
+              <a:rPr lang="es-ES" dirty="0"/>
+              <a:t>La función también puede retornar funciones</a:t>
+            </a:r>
           </a:p>
         </p:txBody>
       </p:sp>
     </p:spTree>
+    <p:extLst>
+      <p:ext uri="{BB962C8B-B14F-4D97-AF65-F5344CB8AC3E}">
+        <p14:creationId xmlns:p14="http://schemas.microsoft.com/office/powerpoint/2010/main" val="891292356"/>
+      </p:ext>
+    </p:extLst>
   </p:cSld>
   <p:clrMapOvr>
     <a:masterClrMapping/>

</xml_diff>